<commit_message>
Analytics - intro and distributions
</commit_message>
<xml_diff>
--- a/Analytics/00-1 Остновы статистики ЦПТ/Presentation/00-1 Intro in statistics.pptx
+++ b/Analytics/00-1 Остновы статистики ЦПТ/Presentation/00-1 Intro in statistics.pptx
@@ -5,7 +5,7 @@
     <p:sldMasterId id="2147483648" r:id="rId1"/>
   </p:sldMasterIdLst>
   <p:notesMasterIdLst>
-    <p:notesMasterId r:id="rId45"/>
+    <p:notesMasterId r:id="rId46"/>
   </p:notesMasterIdLst>
   <p:sldIdLst>
     <p:sldId id="256" r:id="rId2"/>
@@ -26,31 +26,32 @@
     <p:sldId id="400" r:id="rId17"/>
     <p:sldId id="401" r:id="rId18"/>
     <p:sldId id="404" r:id="rId19"/>
-    <p:sldId id="403" r:id="rId20"/>
-    <p:sldId id="402" r:id="rId21"/>
-    <p:sldId id="405" r:id="rId22"/>
-    <p:sldId id="472" r:id="rId23"/>
-    <p:sldId id="473" r:id="rId24"/>
-    <p:sldId id="453" r:id="rId25"/>
-    <p:sldId id="474" r:id="rId26"/>
-    <p:sldId id="475" r:id="rId27"/>
-    <p:sldId id="476" r:id="rId28"/>
-    <p:sldId id="477" r:id="rId29"/>
-    <p:sldId id="480" r:id="rId30"/>
-    <p:sldId id="479" r:id="rId31"/>
-    <p:sldId id="483" r:id="rId32"/>
-    <p:sldId id="478" r:id="rId33"/>
-    <p:sldId id="482" r:id="rId34"/>
-    <p:sldId id="481" r:id="rId35"/>
-    <p:sldId id="391" r:id="rId36"/>
-    <p:sldId id="300" r:id="rId37"/>
-    <p:sldId id="484" r:id="rId38"/>
-    <p:sldId id="364" r:id="rId39"/>
-    <p:sldId id="281" r:id="rId40"/>
-    <p:sldId id="377" r:id="rId41"/>
-    <p:sldId id="301" r:id="rId42"/>
-    <p:sldId id="302" r:id="rId43"/>
-    <p:sldId id="335" r:id="rId44"/>
+    <p:sldId id="485" r:id="rId20"/>
+    <p:sldId id="403" r:id="rId21"/>
+    <p:sldId id="402" r:id="rId22"/>
+    <p:sldId id="405" r:id="rId23"/>
+    <p:sldId id="472" r:id="rId24"/>
+    <p:sldId id="473" r:id="rId25"/>
+    <p:sldId id="453" r:id="rId26"/>
+    <p:sldId id="474" r:id="rId27"/>
+    <p:sldId id="475" r:id="rId28"/>
+    <p:sldId id="476" r:id="rId29"/>
+    <p:sldId id="477" r:id="rId30"/>
+    <p:sldId id="480" r:id="rId31"/>
+    <p:sldId id="479" r:id="rId32"/>
+    <p:sldId id="483" r:id="rId33"/>
+    <p:sldId id="478" r:id="rId34"/>
+    <p:sldId id="482" r:id="rId35"/>
+    <p:sldId id="481" r:id="rId36"/>
+    <p:sldId id="391" r:id="rId37"/>
+    <p:sldId id="300" r:id="rId38"/>
+    <p:sldId id="484" r:id="rId39"/>
+    <p:sldId id="364" r:id="rId40"/>
+    <p:sldId id="281" r:id="rId41"/>
+    <p:sldId id="377" r:id="rId42"/>
+    <p:sldId id="301" r:id="rId43"/>
+    <p:sldId id="302" r:id="rId44"/>
+    <p:sldId id="335" r:id="rId45"/>
   </p:sldIdLst>
   <p:sldSz cx="9144000" cy="5143500" type="screen16x9"/>
   <p:notesSz cx="9144000" cy="5143500"/>
@@ -250,7 +251,7 @@
           <a:p>
             <a:fld id="{929D4DEE-AA18-4B6A-845C-60AFD9463AA2}" type="datetimeFigureOut">
               <a:rPr lang="ru-RU" smtClean="0"/>
-              <a:t>13.10.2024</a:t>
+              <a:t>19.10.2024</a:t>
             </a:fld>
             <a:endParaRPr lang="ru-RU"/>
           </a:p>
@@ -2671,7 +2672,7 @@
           <a:p>
             <a:fld id="{1D8BD707-D9CF-40AE-B4C6-C98DA3205C09}" type="datetimeFigureOut">
               <a:rPr lang="en-US"/>
-              <a:t>10/13/24</a:t>
+              <a:t>10/19/24</a:t>
             </a:fld>
             <a:endParaRPr lang="en-US"/>
           </a:p>
@@ -2846,7 +2847,7 @@
           <a:p>
             <a:fld id="{1D8BD707-D9CF-40AE-B4C6-C98DA3205C09}" type="datetimeFigureOut">
               <a:rPr lang="en-US"/>
-              <a:t>10/13/24</a:t>
+              <a:t>10/19/24</a:t>
             </a:fld>
             <a:endParaRPr lang="en-US"/>
           </a:p>
@@ -3102,7 +3103,7 @@
           <a:p>
             <a:fld id="{1D8BD707-D9CF-40AE-B4C6-C98DA3205C09}" type="datetimeFigureOut">
               <a:rPr lang="en-US"/>
-              <a:t>10/13/24</a:t>
+              <a:t>10/19/24</a:t>
             </a:fld>
             <a:endParaRPr lang="en-US"/>
           </a:p>
@@ -3280,7 +3281,7 @@
           <a:p>
             <a:fld id="{1D8BD707-D9CF-40AE-B4C6-C98DA3205C09}" type="datetimeFigureOut">
               <a:rPr lang="en-US"/>
-              <a:t>10/13/24</a:t>
+              <a:t>10/19/24</a:t>
             </a:fld>
             <a:endParaRPr lang="en-US"/>
           </a:p>
@@ -3399,7 +3400,7 @@
           <a:p>
             <a:fld id="{1D8BD707-D9CF-40AE-B4C6-C98DA3205C09}" type="datetimeFigureOut">
               <a:rPr lang="en-US"/>
-              <a:t>10/13/24</a:t>
+              <a:t>10/19/24</a:t>
             </a:fld>
             <a:endParaRPr lang="en-US"/>
           </a:p>
@@ -6100,7 +6101,7 @@
           <a:p>
             <a:fld id="{1D8BD707-D9CF-40AE-B4C6-C98DA3205C09}" type="datetimeFigureOut">
               <a:rPr lang="en-US"/>
-              <a:t>10/13/24</a:t>
+              <a:t>10/19/24</a:t>
             </a:fld>
             <a:endParaRPr lang="en-US"/>
           </a:p>
@@ -8198,7 +8199,7 @@
   <p:cSld>
     <p:spTree>
       <p:nvGrpSpPr>
-        <p:cNvPr id="1" name="Shape 479"/>
+        <p:cNvPr id="1" name=""/>
         <p:cNvGrpSpPr/>
         <p:nvPr/>
       </p:nvGrpSpPr>
@@ -8212,8 +8213,14 @@
       </p:grpSpPr>
       <p:sp>
         <p:nvSpPr>
-          <p:cNvPr id="480" name="Google Shape;480;p74"/>
-          <p:cNvSpPr txBox="1">
+          <p:cNvPr id="2" name="Title 1">
+            <a:extLst>
+              <a:ext uri="{FF2B5EF4-FFF2-40B4-BE49-F238E27FC236}">
+                <a16:creationId xmlns:a16="http://schemas.microsoft.com/office/drawing/2014/main" id="{73186EB4-0F15-CE45-856A-EC3EBA601CE6}"/>
+              </a:ext>
+            </a:extLst>
+          </p:cNvPr>
+          <p:cNvSpPr>
             <a:spLocks noGrp="1"/>
           </p:cNvSpPr>
           <p:nvPr>
@@ -8222,47 +8229,61 @@
         </p:nvSpPr>
         <p:spPr>
           <a:xfrm>
-            <a:off x="651425" y="396394"/>
-            <a:ext cx="7706100" cy="4090800"/>
+            <a:off x="533400" y="330724"/>
+            <a:ext cx="8487750" cy="1095900"/>
+          </a:xfrm>
+        </p:spPr>
+        <p:txBody>
+          <a:bodyPr/>
+          <a:lstStyle/>
+          <a:p>
+            <a:r>
+              <a:rPr lang="ru-RU" dirty="0"/>
+              <a:t>Меры центральной тенденции</a:t>
+            </a:r>
+            <a:endParaRPr lang="en-US" dirty="0"/>
+          </a:p>
+        </p:txBody>
+      </p:sp>
+      <p:pic>
+        <p:nvPicPr>
+          <p:cNvPr id="7" name="Picture 6">
+            <a:extLst>
+              <a:ext uri="{FF2B5EF4-FFF2-40B4-BE49-F238E27FC236}">
+                <a16:creationId xmlns:a16="http://schemas.microsoft.com/office/drawing/2014/main" id="{FFFFB045-55B0-4640-B618-B6CF40C667AE}"/>
+              </a:ext>
+            </a:extLst>
+          </p:cNvPr>
+          <p:cNvPicPr>
+            <a:picLocks noChangeAspect="1"/>
+          </p:cNvPicPr>
+          <p:nvPr/>
+        </p:nvPicPr>
+        <p:blipFill rotWithShape="1">
+          <a:blip r:embed="rId2">
+            <a:extLst>
+              <a:ext uri="{28A0092B-C50C-407E-A947-70E740481C1C}">
+                <a14:useLocalDpi xmlns:a14="http://schemas.microsoft.com/office/drawing/2010/main" val="0"/>
+              </a:ext>
+            </a:extLst>
+          </a:blip>
+          <a:srcRect l="6434" t="7541" r="8847"/>
+          <a:stretch/>
+        </p:blipFill>
+        <p:spPr>
+          <a:xfrm>
+            <a:off x="1562100" y="1123950"/>
+            <a:ext cx="6019800" cy="3941914"/>
           </a:xfrm>
           <a:prstGeom prst="rect">
             <a:avLst/>
           </a:prstGeom>
-          <a:noFill/>
-          <a:ln>
-            <a:noFill/>
-          </a:ln>
-        </p:spPr>
-        <p:txBody>
-          <a:bodyPr spcFirstLastPara="1" wrap="square" lIns="91425" tIns="91425" rIns="91425" bIns="91425" anchor="ctr" anchorCtr="0">
-            <a:noAutofit/>
-          </a:bodyPr>
-          <a:lstStyle/>
-          <a:p>
-            <a:pPr marL="0" lvl="0" indent="0" algn="l" rtl="0">
-              <a:lnSpc>
-                <a:spcPct val="100000"/>
-              </a:lnSpc>
-              <a:spcBef>
-                <a:spcPts val="0"/>
-              </a:spcBef>
-              <a:spcAft>
-                <a:spcPts val="0"/>
-              </a:spcAft>
-              <a:buSzPts val="4600"/>
-              <a:buNone/>
-            </a:pPr>
-            <a:r>
-              <a:rPr lang="ru-RU" dirty="0"/>
-              <a:t>Точечные и интервальные оценки</a:t>
-            </a:r>
-          </a:p>
-        </p:txBody>
-      </p:sp>
+        </p:spPr>
+      </p:pic>
     </p:spTree>
     <p:extLst>
       <p:ext uri="{BB962C8B-B14F-4D97-AF65-F5344CB8AC3E}">
-        <p14:creationId xmlns:p14="http://schemas.microsoft.com/office/powerpoint/2010/main" val="2901618099"/>
+        <p14:creationId xmlns:p14="http://schemas.microsoft.com/office/powerpoint/2010/main" val="537084465"/>
       </p:ext>
     </p:extLst>
   </p:cSld>
@@ -8618,6 +8639,85 @@
   <p:cSld>
     <p:spTree>
       <p:nvGrpSpPr>
+        <p:cNvPr id="1" name="Shape 479"/>
+        <p:cNvGrpSpPr/>
+        <p:nvPr/>
+      </p:nvGrpSpPr>
+      <p:grpSpPr>
+        <a:xfrm>
+          <a:off x="0" y="0"/>
+          <a:ext cx="0" cy="0"/>
+          <a:chOff x="0" y="0"/>
+          <a:chExt cx="0" cy="0"/>
+        </a:xfrm>
+      </p:grpSpPr>
+      <p:sp>
+        <p:nvSpPr>
+          <p:cNvPr id="480" name="Google Shape;480;p74"/>
+          <p:cNvSpPr txBox="1">
+            <a:spLocks noGrp="1"/>
+          </p:cNvSpPr>
+          <p:nvPr>
+            <p:ph type="title"/>
+          </p:nvPr>
+        </p:nvSpPr>
+        <p:spPr>
+          <a:xfrm>
+            <a:off x="651425" y="396394"/>
+            <a:ext cx="7706100" cy="4090800"/>
+          </a:xfrm>
+          <a:prstGeom prst="rect">
+            <a:avLst/>
+          </a:prstGeom>
+          <a:noFill/>
+          <a:ln>
+            <a:noFill/>
+          </a:ln>
+        </p:spPr>
+        <p:txBody>
+          <a:bodyPr spcFirstLastPara="1" wrap="square" lIns="91425" tIns="91425" rIns="91425" bIns="91425" anchor="ctr" anchorCtr="0">
+            <a:noAutofit/>
+          </a:bodyPr>
+          <a:lstStyle/>
+          <a:p>
+            <a:pPr marL="0" lvl="0" indent="0" algn="l" rtl="0">
+              <a:lnSpc>
+                <a:spcPct val="100000"/>
+              </a:lnSpc>
+              <a:spcBef>
+                <a:spcPts val="0"/>
+              </a:spcBef>
+              <a:spcAft>
+                <a:spcPts val="0"/>
+              </a:spcAft>
+              <a:buSzPts val="4600"/>
+              <a:buNone/>
+            </a:pPr>
+            <a:r>
+              <a:rPr lang="ru-RU" dirty="0"/>
+              <a:t>Точечные и интервальные оценки</a:t>
+            </a:r>
+          </a:p>
+        </p:txBody>
+      </p:sp>
+    </p:spTree>
+    <p:extLst>
+      <p:ext uri="{BB962C8B-B14F-4D97-AF65-F5344CB8AC3E}">
+        <p14:creationId xmlns:p14="http://schemas.microsoft.com/office/powerpoint/2010/main" val="2901618099"/>
+      </p:ext>
+    </p:extLst>
+  </p:cSld>
+  <p:clrMapOvr>
+    <a:masterClrMapping/>
+  </p:clrMapOvr>
+</p:sld>
+</file>
+
+<file path=ppt/slides/slide21.xml><?xml version="1.0" encoding="utf-8"?>
+<p:sld xmlns:a="http://schemas.openxmlformats.org/drawingml/2006/main" xmlns:r="http://schemas.openxmlformats.org/officeDocument/2006/relationships" xmlns:p="http://schemas.openxmlformats.org/presentationml/2006/main">
+  <p:cSld>
+    <p:spTree>
+      <p:nvGrpSpPr>
         <p:cNvPr id="1" name=""/>
         <p:cNvGrpSpPr/>
         <p:nvPr/>
@@ -8786,7 +8886,7 @@
 </p:sld>
 </file>
 
-<file path=ppt/slides/slide21.xml><?xml version="1.0" encoding="utf-8"?>
+<file path=ppt/slides/slide22.xml><?xml version="1.0" encoding="utf-8"?>
 <p:sld xmlns:a="http://schemas.openxmlformats.org/drawingml/2006/main" xmlns:r="http://schemas.openxmlformats.org/officeDocument/2006/relationships" xmlns:p="http://schemas.openxmlformats.org/presentationml/2006/main">
   <p:cSld>
     <p:spTree>
@@ -8865,7 +8965,7 @@
 </p:sld>
 </file>
 
-<file path=ppt/slides/slide22.xml><?xml version="1.0" encoding="utf-8"?>
+<file path=ppt/slides/slide23.xml><?xml version="1.0" encoding="utf-8"?>
 <p:sld xmlns:a="http://schemas.openxmlformats.org/drawingml/2006/main" xmlns:r="http://schemas.openxmlformats.org/officeDocument/2006/relationships" xmlns:p="http://schemas.openxmlformats.org/presentationml/2006/main">
   <p:cSld>
     <p:spTree>
@@ -9392,7 +9492,7 @@
 </p:sld>
 </file>
 
-<file path=ppt/slides/slide23.xml><?xml version="1.0" encoding="utf-8"?>
+<file path=ppt/slides/slide24.xml><?xml version="1.0" encoding="utf-8"?>
 <p:sld xmlns:a="http://schemas.openxmlformats.org/drawingml/2006/main" xmlns:r="http://schemas.openxmlformats.org/officeDocument/2006/relationships" xmlns:p="http://schemas.openxmlformats.org/presentationml/2006/main">
   <p:cSld>
     <p:spTree>
@@ -9559,7 +9659,7 @@
 </p:sld>
 </file>
 
-<file path=ppt/slides/slide24.xml><?xml version="1.0" encoding="utf-8"?>
+<file path=ppt/slides/slide25.xml><?xml version="1.0" encoding="utf-8"?>
 <p:sld xmlns:a="http://schemas.openxmlformats.org/drawingml/2006/main" xmlns:r="http://schemas.openxmlformats.org/officeDocument/2006/relationships" xmlns:p="http://schemas.openxmlformats.org/presentationml/2006/main">
   <p:cSld>
     <p:spTree>
@@ -10026,7 +10126,7 @@
 </p:sld>
 </file>
 
-<file path=ppt/slides/slide25.xml><?xml version="1.0" encoding="utf-8"?>
+<file path=ppt/slides/slide26.xml><?xml version="1.0" encoding="utf-8"?>
 <p:sld xmlns:a="http://schemas.openxmlformats.org/drawingml/2006/main" xmlns:r="http://schemas.openxmlformats.org/officeDocument/2006/relationships" xmlns:p="http://schemas.openxmlformats.org/presentationml/2006/main">
   <p:cSld>
     <p:spTree>
@@ -10821,7 +10921,7 @@
 </p:sld>
 </file>
 
-<file path=ppt/slides/slide26.xml><?xml version="1.0" encoding="utf-8"?>
+<file path=ppt/slides/slide27.xml><?xml version="1.0" encoding="utf-8"?>
 <p:sld xmlns:a="http://schemas.openxmlformats.org/drawingml/2006/main" xmlns:r="http://schemas.openxmlformats.org/officeDocument/2006/relationships" xmlns:p="http://schemas.openxmlformats.org/presentationml/2006/main">
   <p:cSld>
     <p:spTree>
@@ -10963,7 +11063,7 @@
 </p:sld>
 </file>
 
-<file path=ppt/slides/slide27.xml><?xml version="1.0" encoding="utf-8"?>
+<file path=ppt/slides/slide28.xml><?xml version="1.0" encoding="utf-8"?>
 <p:sld xmlns:a="http://schemas.openxmlformats.org/drawingml/2006/main" xmlns:r="http://schemas.openxmlformats.org/officeDocument/2006/relationships" xmlns:p="http://schemas.openxmlformats.org/presentationml/2006/main">
   <p:cSld>
     <p:spTree>
@@ -11042,7 +11142,7 @@
 </p:sld>
 </file>
 
-<file path=ppt/slides/slide28.xml><?xml version="1.0" encoding="utf-8"?>
+<file path=ppt/slides/slide29.xml><?xml version="1.0" encoding="utf-8"?>
 <p:sld xmlns:a="http://schemas.openxmlformats.org/drawingml/2006/main" xmlns:r="http://schemas.openxmlformats.org/officeDocument/2006/relationships" xmlns:p="http://schemas.openxmlformats.org/presentationml/2006/main">
   <p:cSld>
     <p:spTree>
@@ -11088,8 +11188,8 @@
           </a:p>
         </p:txBody>
       </p:sp>
-      <mc:AlternateContent xmlns:mc="http://schemas.openxmlformats.org/markup-compatibility/2006">
-        <mc:Choice xmlns:a14="http://schemas.microsoft.com/office/drawing/2010/main" Requires="a14">
+      <mc:AlternateContent xmlns:mc="http://schemas.openxmlformats.org/markup-compatibility/2006" xmlns:a14="http://schemas.microsoft.com/office/drawing/2010/main">
+        <mc:Choice Requires="a14">
           <p:sp>
             <p:nvSpPr>
               <p:cNvPr id="8" name="TextBox 7">
@@ -11118,6 +11218,7 @@
               </a:bodyPr>
               <a:lstStyle/>
               <a:p>
+                <a:pPr/>
                 <a14:m>
                   <m:oMathPara xmlns:m="http://schemas.openxmlformats.org/officeDocument/2006/math">
                     <m:oMathParaPr>
@@ -11373,7 +11474,7 @@
             </p:txBody>
           </p:sp>
         </mc:Choice>
-        <mc:Fallback>
+        <mc:Fallback xmlns="">
           <p:sp>
             <p:nvSpPr>
               <p:cNvPr id="8" name="TextBox 7">
@@ -11461,7 +11562,693 @@
 </p:sld>
 </file>
 
-<file path=ppt/slides/slide29.xml><?xml version="1.0" encoding="utf-8"?>
+<file path=ppt/slides/slide3.xml><?xml version="1.0" encoding="utf-8"?>
+<p:sld xmlns:a="http://schemas.openxmlformats.org/drawingml/2006/main" xmlns:r="http://schemas.openxmlformats.org/officeDocument/2006/relationships" xmlns:p="http://schemas.openxmlformats.org/presentationml/2006/main">
+  <p:cSld>
+    <p:spTree>
+      <p:nvGrpSpPr>
+        <p:cNvPr id="1" name="Shape 203"/>
+        <p:cNvGrpSpPr/>
+        <p:nvPr/>
+      </p:nvGrpSpPr>
+      <p:grpSpPr>
+        <a:xfrm>
+          <a:off x="0" y="0"/>
+          <a:ext cx="0" cy="0"/>
+          <a:chOff x="0" y="0"/>
+          <a:chExt cx="0" cy="0"/>
+        </a:xfrm>
+      </p:grpSpPr>
+      <p:sp>
+        <p:nvSpPr>
+          <p:cNvPr id="204" name="Google Shape;204;p48"/>
+          <p:cNvSpPr/>
+          <p:nvPr/>
+        </p:nvSpPr>
+        <p:spPr>
+          <a:xfrm>
+            <a:off x="630000" y="2703050"/>
+            <a:ext cx="1033800" cy="1983600"/>
+          </a:xfrm>
+          <a:prstGeom prst="rect">
+            <a:avLst/>
+          </a:prstGeom>
+          <a:solidFill>
+            <a:schemeClr val="accent6"/>
+          </a:solidFill>
+          <a:ln>
+            <a:noFill/>
+          </a:ln>
+        </p:spPr>
+        <p:txBody>
+          <a:bodyPr spcFirstLastPara="1" wrap="square" lIns="91425" tIns="91425" rIns="91425" bIns="91425" anchor="ctr" anchorCtr="0">
+            <a:noAutofit/>
+          </a:bodyPr>
+          <a:lstStyle/>
+          <a:p>
+            <a:pPr marL="0" lvl="0" indent="0" algn="l" rtl="0">
+              <a:spcBef>
+                <a:spcPts val="0"/>
+              </a:spcBef>
+              <a:spcAft>
+                <a:spcPts val="0"/>
+              </a:spcAft>
+              <a:buNone/>
+            </a:pPr>
+            <a:endParaRPr/>
+          </a:p>
+        </p:txBody>
+      </p:sp>
+      <p:sp>
+        <p:nvSpPr>
+          <p:cNvPr id="206" name="Google Shape;206;p48"/>
+          <p:cNvSpPr txBox="1">
+            <a:spLocks noGrp="1"/>
+          </p:cNvSpPr>
+          <p:nvPr>
+            <p:ph type="title"/>
+          </p:nvPr>
+        </p:nvSpPr>
+        <p:spPr>
+          <a:xfrm>
+            <a:off x="500550" y="821219"/>
+            <a:ext cx="8520600" cy="1032900"/>
+          </a:xfrm>
+          <a:prstGeom prst="rect">
+            <a:avLst/>
+          </a:prstGeom>
+        </p:spPr>
+        <p:txBody>
+          <a:bodyPr spcFirstLastPara="1" wrap="square" lIns="91425" tIns="91425" rIns="91425" bIns="91425" anchor="t" anchorCtr="0">
+            <a:noAutofit/>
+          </a:bodyPr>
+          <a:lstStyle/>
+          <a:p>
+            <a:pPr marL="0" lvl="0" indent="0" algn="l" rtl="0">
+              <a:spcBef>
+                <a:spcPts val="0"/>
+              </a:spcBef>
+              <a:spcAft>
+                <a:spcPts val="0"/>
+              </a:spcAft>
+              <a:buClr>
+                <a:schemeClr val="dk1"/>
+              </a:buClr>
+              <a:buSzPts val="1100"/>
+              <a:buFont typeface="Arial"/>
+              <a:buNone/>
+            </a:pPr>
+            <a:r>
+              <a:rPr lang="en-US" dirty="0"/>
+              <a:t>Python </a:t>
+            </a:r>
+            <a:r>
+              <a:rPr lang="ru-RU" dirty="0"/>
+              <a:t>для аналитики</a:t>
+            </a:r>
+            <a:br>
+              <a:rPr lang="en-US" dirty="0"/>
+            </a:br>
+            <a:r>
+              <a:rPr lang="ru-RU" sz="3200" b="1" dirty="0">
+                <a:latin typeface="Roboto"/>
+                <a:ea typeface="Roboto"/>
+                <a:cs typeface="Roboto"/>
+                <a:sym typeface="Roboto"/>
+              </a:rPr>
+              <a:t>Основы статистики</a:t>
+            </a:r>
+            <a:endParaRPr dirty="0"/>
+          </a:p>
+        </p:txBody>
+      </p:sp>
+      <p:sp>
+        <p:nvSpPr>
+          <p:cNvPr id="207" name="Google Shape;207;p48"/>
+          <p:cNvSpPr txBox="1">
+            <a:spLocks noGrp="1"/>
+          </p:cNvSpPr>
+          <p:nvPr>
+            <p:ph type="subTitle" idx="1"/>
+          </p:nvPr>
+        </p:nvSpPr>
+        <p:spPr>
+          <a:xfrm>
+            <a:off x="500550" y="520133"/>
+            <a:ext cx="7796700" cy="356926"/>
+          </a:xfrm>
+          <a:prstGeom prst="rect">
+            <a:avLst/>
+          </a:prstGeom>
+        </p:spPr>
+        <p:txBody>
+          <a:bodyPr spcFirstLastPara="1" wrap="square" lIns="91425" tIns="91425" rIns="91425" bIns="91425" anchor="t" anchorCtr="0">
+            <a:normAutofit fontScale="92500" lnSpcReduction="20000"/>
+          </a:bodyPr>
+          <a:lstStyle/>
+          <a:p>
+            <a:pPr marL="0" lvl="0" indent="0" algn="l" rtl="0">
+              <a:spcBef>
+                <a:spcPts val="0"/>
+              </a:spcBef>
+              <a:spcAft>
+                <a:spcPts val="0"/>
+              </a:spcAft>
+              <a:buNone/>
+            </a:pPr>
+            <a:r>
+              <a:rPr lang="ru" dirty="0"/>
+              <a:t>Тема вебинара</a:t>
+            </a:r>
+            <a:endParaRPr dirty="0"/>
+          </a:p>
+        </p:txBody>
+      </p:sp>
+      <p:sp>
+        <p:nvSpPr>
+          <p:cNvPr id="208" name="Google Shape;208;p48"/>
+          <p:cNvSpPr txBox="1">
+            <a:spLocks noGrp="1"/>
+          </p:cNvSpPr>
+          <p:nvPr>
+            <p:ph type="subTitle" idx="2"/>
+          </p:nvPr>
+        </p:nvSpPr>
+        <p:spPr>
+          <a:xfrm>
+            <a:off x="3082400" y="2304911"/>
+            <a:ext cx="5856300" cy="396900"/>
+          </a:xfrm>
+          <a:prstGeom prst="rect">
+            <a:avLst/>
+          </a:prstGeom>
+        </p:spPr>
+        <p:txBody>
+          <a:bodyPr spcFirstLastPara="1" wrap="square" lIns="91425" tIns="91425" rIns="91425" bIns="91425" anchor="t" anchorCtr="0">
+            <a:normAutofit lnSpcReduction="10000"/>
+          </a:bodyPr>
+          <a:lstStyle/>
+          <a:p>
+            <a:pPr marL="0" lvl="0" indent="0" algn="l" rtl="0">
+              <a:spcBef>
+                <a:spcPts val="0"/>
+              </a:spcBef>
+              <a:spcAft>
+                <a:spcPts val="0"/>
+              </a:spcAft>
+              <a:buNone/>
+            </a:pPr>
+            <a:r>
+              <a:rPr lang="ru" dirty="0"/>
+              <a:t>Игорь Стурейко</a:t>
+            </a:r>
+            <a:endParaRPr dirty="0"/>
+          </a:p>
+        </p:txBody>
+      </p:sp>
+      <p:pic>
+        <p:nvPicPr>
+          <p:cNvPr id="3" name="Picture 2">
+            <a:extLst>
+              <a:ext uri="{FF2B5EF4-FFF2-40B4-BE49-F238E27FC236}">
+                <a16:creationId xmlns:a16="http://schemas.microsoft.com/office/drawing/2014/main" id="{522215E3-7B5E-BC4F-9DA6-F65D728D82F1}"/>
+              </a:ext>
+            </a:extLst>
+          </p:cNvPr>
+          <p:cNvPicPr>
+            <a:picLocks noChangeAspect="1"/>
+          </p:cNvPicPr>
+          <p:nvPr/>
+        </p:nvPicPr>
+        <p:blipFill rotWithShape="1">
+          <a:blip r:embed="rId3">
+            <a:extLst>
+              <a:ext uri="{28A0092B-C50C-407E-A947-70E740481C1C}">
+                <a14:useLocalDpi xmlns:a14="http://schemas.microsoft.com/office/drawing/2010/main" val="0"/>
+              </a:ext>
+            </a:extLst>
+          </a:blip>
+          <a:srcRect l="-1" t="12156" r="295"/>
+          <a:stretch/>
+        </p:blipFill>
+        <p:spPr>
+          <a:xfrm>
+            <a:off x="832654" y="2865544"/>
+            <a:ext cx="1662292" cy="1657372"/>
+          </a:xfrm>
+          <a:prstGeom prst="ellipse">
+            <a:avLst/>
+          </a:prstGeom>
+          <a:ln w="12700" cap="rnd">
+            <a:solidFill>
+              <a:srgbClr val="333333"/>
+            </a:solidFill>
+          </a:ln>
+          <a:effectLst>
+            <a:outerShdw blurRad="381000" dist="292100" dir="5400000" sx="-80000" sy="-18000" rotWithShape="0">
+              <a:srgbClr val="000000">
+                <a:alpha val="22000"/>
+              </a:srgbClr>
+            </a:outerShdw>
+          </a:effectLst>
+          <a:scene3d>
+            <a:camera prst="orthographicFront"/>
+            <a:lightRig rig="contrasting" dir="t">
+              <a:rot lat="0" lon="0" rev="3000000"/>
+            </a:lightRig>
+          </a:scene3d>
+          <a:sp3d contourW="7620">
+            <a:bevelT w="95250" h="31750"/>
+            <a:contourClr>
+              <a:srgbClr val="333333"/>
+            </a:contourClr>
+          </a:sp3d>
+        </p:spPr>
+      </p:pic>
+      <p:sp>
+        <p:nvSpPr>
+          <p:cNvPr id="10" name="Google Shape;209;p48">
+            <a:extLst>
+              <a:ext uri="{FF2B5EF4-FFF2-40B4-BE49-F238E27FC236}">
+                <a16:creationId xmlns:a16="http://schemas.microsoft.com/office/drawing/2014/main" id="{ED965473-BBD3-AB44-A950-B109F48DEFA0}"/>
+              </a:ext>
+            </a:extLst>
+          </p:cNvPr>
+          <p:cNvSpPr txBox="1">
+            <a:spLocks/>
+          </p:cNvSpPr>
+          <p:nvPr/>
+        </p:nvSpPr>
+        <p:spPr>
+          <a:xfrm>
+            <a:off x="3082400" y="2701811"/>
+            <a:ext cx="5938750" cy="2133660"/>
+          </a:xfrm>
+          <a:prstGeom prst="rect">
+            <a:avLst/>
+          </a:prstGeom>
+          <a:noFill/>
+          <a:ln>
+            <a:noFill/>
+          </a:ln>
+        </p:spPr>
+        <p:txBody>
+          <a:bodyPr spcFirstLastPara="1" wrap="square" lIns="91425" tIns="91425" rIns="91425" bIns="91425" anchor="t" anchorCtr="0">
+            <a:normAutofit fontScale="85000" lnSpcReduction="20000"/>
+          </a:bodyPr>
+          <a:lstStyle>
+            <a:lvl1pPr marL="0" lvl="0" algn="l">
+              <a:lnSpc>
+                <a:spcPct val="100000"/>
+              </a:lnSpc>
+              <a:spcBef>
+                <a:spcPts val="0"/>
+              </a:spcBef>
+              <a:spcAft>
+                <a:spcPts val="0"/>
+              </a:spcAft>
+              <a:buClr>
+                <a:schemeClr val="dk1"/>
+              </a:buClr>
+              <a:buSzPts val="1300"/>
+              <a:buNone/>
+              <a:defRPr sz="1300" b="0" i="0">
+                <a:solidFill>
+                  <a:schemeClr val="dk1"/>
+                </a:solidFill>
+                <a:latin typeface="+mn-lt"/>
+                <a:ea typeface="+mn-ea"/>
+                <a:cs typeface="+mn-cs"/>
+              </a:defRPr>
+            </a:lvl1pPr>
+            <a:lvl2pPr marL="457200" lvl="1" algn="l">
+              <a:lnSpc>
+                <a:spcPct val="100000"/>
+              </a:lnSpc>
+              <a:spcBef>
+                <a:spcPts val="0"/>
+              </a:spcBef>
+              <a:spcAft>
+                <a:spcPts val="0"/>
+              </a:spcAft>
+              <a:buClr>
+                <a:schemeClr val="dk1"/>
+              </a:buClr>
+              <a:buSzPts val="1500"/>
+              <a:buNone/>
+              <a:defRPr>
+                <a:solidFill>
+                  <a:schemeClr val="dk1"/>
+                </a:solidFill>
+                <a:latin typeface="+mn-lt"/>
+                <a:ea typeface="+mn-ea"/>
+                <a:cs typeface="+mn-cs"/>
+              </a:defRPr>
+            </a:lvl2pPr>
+            <a:lvl3pPr marL="914400" lvl="2" algn="l">
+              <a:lnSpc>
+                <a:spcPct val="100000"/>
+              </a:lnSpc>
+              <a:spcBef>
+                <a:spcPts val="0"/>
+              </a:spcBef>
+              <a:spcAft>
+                <a:spcPts val="0"/>
+              </a:spcAft>
+              <a:buClr>
+                <a:schemeClr val="dk1"/>
+              </a:buClr>
+              <a:buSzPts val="1300"/>
+              <a:buNone/>
+              <a:defRPr>
+                <a:solidFill>
+                  <a:schemeClr val="dk1"/>
+                </a:solidFill>
+                <a:latin typeface="+mn-lt"/>
+                <a:ea typeface="+mn-ea"/>
+                <a:cs typeface="+mn-cs"/>
+              </a:defRPr>
+            </a:lvl3pPr>
+            <a:lvl4pPr marL="1371600" lvl="3" algn="l">
+              <a:lnSpc>
+                <a:spcPct val="100000"/>
+              </a:lnSpc>
+              <a:spcBef>
+                <a:spcPts val="0"/>
+              </a:spcBef>
+              <a:spcAft>
+                <a:spcPts val="0"/>
+              </a:spcAft>
+              <a:buClr>
+                <a:schemeClr val="dk1"/>
+              </a:buClr>
+              <a:buSzPts val="1300"/>
+              <a:buNone/>
+              <a:defRPr>
+                <a:solidFill>
+                  <a:schemeClr val="dk1"/>
+                </a:solidFill>
+                <a:latin typeface="+mn-lt"/>
+                <a:ea typeface="+mn-ea"/>
+                <a:cs typeface="+mn-cs"/>
+              </a:defRPr>
+            </a:lvl4pPr>
+            <a:lvl5pPr marL="1828800" lvl="4" algn="l">
+              <a:lnSpc>
+                <a:spcPct val="100000"/>
+              </a:lnSpc>
+              <a:spcBef>
+                <a:spcPts val="0"/>
+              </a:spcBef>
+              <a:spcAft>
+                <a:spcPts val="0"/>
+              </a:spcAft>
+              <a:buClr>
+                <a:schemeClr val="dk1"/>
+              </a:buClr>
+              <a:buSzPts val="1300"/>
+              <a:buNone/>
+              <a:defRPr>
+                <a:solidFill>
+                  <a:schemeClr val="dk1"/>
+                </a:solidFill>
+                <a:latin typeface="+mn-lt"/>
+                <a:ea typeface="+mn-ea"/>
+                <a:cs typeface="+mn-cs"/>
+              </a:defRPr>
+            </a:lvl5pPr>
+            <a:lvl6pPr marL="2286000" lvl="5" algn="l">
+              <a:lnSpc>
+                <a:spcPct val="100000"/>
+              </a:lnSpc>
+              <a:spcBef>
+                <a:spcPts val="0"/>
+              </a:spcBef>
+              <a:spcAft>
+                <a:spcPts val="0"/>
+              </a:spcAft>
+              <a:buClr>
+                <a:schemeClr val="dk1"/>
+              </a:buClr>
+              <a:buSzPts val="1300"/>
+              <a:buNone/>
+              <a:defRPr>
+                <a:solidFill>
+                  <a:schemeClr val="dk1"/>
+                </a:solidFill>
+                <a:latin typeface="+mn-lt"/>
+                <a:ea typeface="+mn-ea"/>
+                <a:cs typeface="+mn-cs"/>
+              </a:defRPr>
+            </a:lvl6pPr>
+            <a:lvl7pPr marL="2743200" lvl="6" algn="l">
+              <a:lnSpc>
+                <a:spcPct val="100000"/>
+              </a:lnSpc>
+              <a:spcBef>
+                <a:spcPts val="0"/>
+              </a:spcBef>
+              <a:spcAft>
+                <a:spcPts val="0"/>
+              </a:spcAft>
+              <a:buClr>
+                <a:schemeClr val="dk1"/>
+              </a:buClr>
+              <a:buSzPts val="1300"/>
+              <a:buNone/>
+              <a:defRPr>
+                <a:solidFill>
+                  <a:schemeClr val="dk1"/>
+                </a:solidFill>
+                <a:latin typeface="+mn-lt"/>
+                <a:ea typeface="+mn-ea"/>
+                <a:cs typeface="+mn-cs"/>
+              </a:defRPr>
+            </a:lvl7pPr>
+            <a:lvl8pPr marL="3200400" lvl="7" algn="l">
+              <a:lnSpc>
+                <a:spcPct val="100000"/>
+              </a:lnSpc>
+              <a:spcBef>
+                <a:spcPts val="0"/>
+              </a:spcBef>
+              <a:spcAft>
+                <a:spcPts val="0"/>
+              </a:spcAft>
+              <a:buClr>
+                <a:schemeClr val="dk1"/>
+              </a:buClr>
+              <a:buSzPts val="1300"/>
+              <a:buNone/>
+              <a:defRPr>
+                <a:solidFill>
+                  <a:schemeClr val="dk1"/>
+                </a:solidFill>
+                <a:latin typeface="+mn-lt"/>
+                <a:ea typeface="+mn-ea"/>
+                <a:cs typeface="+mn-cs"/>
+              </a:defRPr>
+            </a:lvl8pPr>
+            <a:lvl9pPr marL="3657600" lvl="8" algn="l">
+              <a:lnSpc>
+                <a:spcPct val="100000"/>
+              </a:lnSpc>
+              <a:spcBef>
+                <a:spcPts val="0"/>
+              </a:spcBef>
+              <a:spcAft>
+                <a:spcPts val="0"/>
+              </a:spcAft>
+              <a:buClr>
+                <a:schemeClr val="dk1"/>
+              </a:buClr>
+              <a:buSzPts val="1300"/>
+              <a:buNone/>
+              <a:defRPr>
+                <a:solidFill>
+                  <a:schemeClr val="dk1"/>
+                </a:solidFill>
+                <a:latin typeface="+mn-lt"/>
+                <a:ea typeface="+mn-ea"/>
+                <a:cs typeface="+mn-cs"/>
+              </a:defRPr>
+            </a:lvl9pPr>
+          </a:lstStyle>
+          <a:p>
+            <a:pPr marL="1470025" indent="-1465263">
+              <a:tabLst>
+                <a:tab pos="1465263" algn="l"/>
+              </a:tabLst>
+            </a:pPr>
+            <a:r>
+              <a:rPr lang="ru-RU" sz="1150" b="1" kern="0" dirty="0"/>
+              <a:t>Руководитель курсов: </a:t>
+            </a:r>
+            <a:r>
+              <a:rPr lang="en-US" sz="1150" b="1" kern="0" dirty="0"/>
+              <a:t>	Reinforcement Learning, ML Professional, ML Basic, </a:t>
+            </a:r>
+            <a:br>
+              <a:rPr lang="en-US" sz="1150" b="1" kern="0" dirty="0"/>
+            </a:br>
+            <a:r>
+              <a:rPr lang="en-US" sz="1150" b="1" kern="0" dirty="0" err="1"/>
+              <a:t>MLOps</a:t>
+            </a:r>
+            <a:r>
+              <a:rPr lang="en-US" sz="1150" b="1" kern="0" dirty="0"/>
+              <a:t>, </a:t>
+            </a:r>
+            <a:r>
+              <a:rPr lang="en-US" sz="1150" b="1" kern="0" dirty="0" err="1"/>
+              <a:t>FinML</a:t>
+            </a:r>
+            <a:endParaRPr lang="en-US" sz="1150" b="1" kern="0" dirty="0"/>
+          </a:p>
+          <a:p>
+            <a:pPr rtl="0"/>
+            <a:endParaRPr lang="en-US" sz="1150" b="1" kern="0" dirty="0"/>
+          </a:p>
+          <a:p>
+            <a:pPr rtl="0"/>
+            <a:r>
+              <a:rPr lang="en-US" sz="1150" b="1" kern="0" dirty="0" err="1"/>
+              <a:t>Teamlead</a:t>
+            </a:r>
+            <a:endParaRPr lang="ru-RU" sz="1150" b="1" kern="0" dirty="0"/>
+          </a:p>
+          <a:p>
+            <a:pPr rtl="0"/>
+            <a:r>
+              <a:rPr lang="ru-RU" sz="1150" b="1" kern="0" dirty="0"/>
+              <a:t>Физический факультет МГУ, </a:t>
+            </a:r>
+            <a:r>
+              <a:rPr lang="en-US" sz="1150" b="1" kern="0" dirty="0"/>
+              <a:t>PhD </a:t>
+            </a:r>
+            <a:r>
+              <a:rPr lang="ru-RU" sz="1150" b="1" kern="0" dirty="0"/>
+              <a:t>теоретическая физика</a:t>
+            </a:r>
+          </a:p>
+          <a:p>
+            <a:pPr rtl="0"/>
+            <a:endParaRPr lang="ru-RU" sz="1150" kern="0" dirty="0"/>
+          </a:p>
+          <a:p>
+            <a:pPr rtl="0"/>
+            <a:r>
+              <a:rPr lang="ru-RU" sz="1150" b="1" kern="0" dirty="0"/>
+              <a:t>Опыт:</a:t>
+            </a:r>
+            <a:endParaRPr lang="ru-RU" sz="1150" kern="0" dirty="0"/>
+          </a:p>
+          <a:p>
+            <a:pPr rtl="0"/>
+            <a:r>
+              <a:rPr lang="ru-RU" sz="1150" kern="0" dirty="0"/>
+              <a:t>Более 15 лет занимался прикладной математикой и мат моделированием</a:t>
+            </a:r>
+          </a:p>
+          <a:p>
+            <a:pPr rtl="0"/>
+            <a:r>
+              <a:rPr lang="ru-RU" sz="1150" kern="0" dirty="0"/>
+              <a:t>(</a:t>
+            </a:r>
+            <a:r>
+              <a:rPr lang="en-US" sz="1150" kern="0" dirty="0"/>
+              <a:t>Data Scientist) (Python, </a:t>
+            </a:r>
+            <a:r>
+              <a:rPr lang="ru-RU" sz="1150" kern="0" dirty="0"/>
+              <a:t>С++)</a:t>
+            </a:r>
+          </a:p>
+          <a:p>
+            <a:pPr rtl="0"/>
+            <a:endParaRPr lang="ru-RU" sz="1150" kern="0" dirty="0"/>
+          </a:p>
+          <a:p>
+            <a:pPr rtl="0"/>
+            <a:endParaRPr lang="ru-RU" sz="1150" b="1" kern="0" dirty="0"/>
+          </a:p>
+          <a:p>
+            <a:pPr rtl="0"/>
+            <a:r>
+              <a:rPr lang="ru-RU" sz="1150" b="1" kern="0" dirty="0"/>
+              <a:t>@</a:t>
+            </a:r>
+            <a:r>
+              <a:rPr lang="en-US" sz="1150" b="1" kern="0" dirty="0" err="1"/>
+              <a:t>stureiko</a:t>
+            </a:r>
+            <a:r>
+              <a:rPr lang="en-US" sz="1150" b="1" kern="0" dirty="0"/>
+              <a:t> (TG)</a:t>
+            </a:r>
+          </a:p>
+          <a:p>
+            <a:pPr rtl="0"/>
+            <a:endParaRPr lang="en-US" sz="1150" b="1" kern="0" dirty="0"/>
+          </a:p>
+          <a:p>
+            <a:pPr rtl="0"/>
+            <a:r>
+              <a:rPr lang="en-US" sz="1150" b="1" kern="0" dirty="0"/>
+              <a:t>LinkedIn: </a:t>
+            </a:r>
+            <a:r>
+              <a:rPr lang="en-US" sz="1150" kern="0" dirty="0">
+                <a:hlinkClick r:id="rId4"/>
+              </a:rPr>
+              <a:t>igor-stureiko</a:t>
+            </a:r>
+            <a:r>
+              <a:rPr lang="en-US" sz="1150" kern="0" dirty="0"/>
+              <a:t> </a:t>
+            </a:r>
+          </a:p>
+          <a:p>
+            <a:pPr rtl="0"/>
+            <a:endParaRPr lang="en-US" sz="1150" kern="0" dirty="0"/>
+          </a:p>
+          <a:p>
+            <a:pPr rtl="0"/>
+            <a:r>
+              <a:rPr lang="en-US" sz="1150" b="1" kern="0" dirty="0"/>
+              <a:t>@</a:t>
+            </a:r>
+            <a:r>
+              <a:rPr lang="en-US" sz="1150" b="1" kern="0" dirty="0" err="1"/>
+              <a:t>rl_fintech</a:t>
+            </a:r>
+            <a:r>
+              <a:rPr lang="en-US" sz="1150" b="1" kern="0" dirty="0"/>
+              <a:t> </a:t>
+            </a:r>
+            <a:r>
+              <a:rPr lang="en-US" sz="1150" kern="0" dirty="0"/>
+              <a:t>(</a:t>
+            </a:r>
+            <a:r>
+              <a:rPr lang="ru-RU" sz="1150" kern="0" dirty="0"/>
+              <a:t>Мой канал о моделях в бизнесе)</a:t>
+            </a:r>
+            <a:endParaRPr lang="ru-RU" sz="1400" kern="0" dirty="0"/>
+          </a:p>
+        </p:txBody>
+      </p:sp>
+    </p:spTree>
+  </p:cSld>
+  <p:clrMapOvr>
+    <a:masterClrMapping/>
+  </p:clrMapOvr>
+</p:sld>
+</file>
+
+<file path=ppt/slides/slide30.xml><?xml version="1.0" encoding="utf-8"?>
 <p:sld xmlns:a="http://schemas.openxmlformats.org/drawingml/2006/main" xmlns:r="http://schemas.openxmlformats.org/officeDocument/2006/relationships" xmlns:p="http://schemas.openxmlformats.org/presentationml/2006/main">
   <p:cSld>
     <p:spTree>
@@ -11478,8 +12265,8 @@
           <a:chExt cx="0" cy="0"/>
         </a:xfrm>
       </p:grpSpPr>
-      <mc:AlternateContent xmlns:mc="http://schemas.openxmlformats.org/markup-compatibility/2006">
-        <mc:Choice xmlns:a14="http://schemas.microsoft.com/office/drawing/2010/main" Requires="a14">
+      <mc:AlternateContent xmlns:mc="http://schemas.openxmlformats.org/markup-compatibility/2006" xmlns:a14="http://schemas.microsoft.com/office/drawing/2010/main">
+        <mc:Choice Requires="a14">
           <p:sp>
             <p:nvSpPr>
               <p:cNvPr id="3" name="Title 2">
@@ -11549,7 +12336,7 @@
             </p:txBody>
           </p:sp>
         </mc:Choice>
-        <mc:Fallback>
+        <mc:Fallback xmlns="">
           <p:sp>
             <p:nvSpPr>
               <p:cNvPr id="3" name="Title 2">
@@ -11676,817 +12463,6 @@
 </p:sld>
 </file>
 
-<file path=ppt/slides/slide3.xml><?xml version="1.0" encoding="utf-8"?>
-<p:sld xmlns:a="http://schemas.openxmlformats.org/drawingml/2006/main" xmlns:r="http://schemas.openxmlformats.org/officeDocument/2006/relationships" xmlns:p="http://schemas.openxmlformats.org/presentationml/2006/main">
-  <p:cSld>
-    <p:spTree>
-      <p:nvGrpSpPr>
-        <p:cNvPr id="1" name="Shape 203"/>
-        <p:cNvGrpSpPr/>
-        <p:nvPr/>
-      </p:nvGrpSpPr>
-      <p:grpSpPr>
-        <a:xfrm>
-          <a:off x="0" y="0"/>
-          <a:ext cx="0" cy="0"/>
-          <a:chOff x="0" y="0"/>
-          <a:chExt cx="0" cy="0"/>
-        </a:xfrm>
-      </p:grpSpPr>
-      <p:sp>
-        <p:nvSpPr>
-          <p:cNvPr id="204" name="Google Shape;204;p48"/>
-          <p:cNvSpPr/>
-          <p:nvPr/>
-        </p:nvSpPr>
-        <p:spPr>
-          <a:xfrm>
-            <a:off x="630000" y="2703050"/>
-            <a:ext cx="1033800" cy="1983600"/>
-          </a:xfrm>
-          <a:prstGeom prst="rect">
-            <a:avLst/>
-          </a:prstGeom>
-          <a:solidFill>
-            <a:schemeClr val="accent6"/>
-          </a:solidFill>
-          <a:ln>
-            <a:noFill/>
-          </a:ln>
-        </p:spPr>
-        <p:txBody>
-          <a:bodyPr spcFirstLastPara="1" wrap="square" lIns="91425" tIns="91425" rIns="91425" bIns="91425" anchor="ctr" anchorCtr="0">
-            <a:noAutofit/>
-          </a:bodyPr>
-          <a:lstStyle/>
-          <a:p>
-            <a:pPr marL="0" lvl="0" indent="0" algn="l" rtl="0">
-              <a:spcBef>
-                <a:spcPts val="0"/>
-              </a:spcBef>
-              <a:spcAft>
-                <a:spcPts val="0"/>
-              </a:spcAft>
-              <a:buNone/>
-            </a:pPr>
-            <a:endParaRPr/>
-          </a:p>
-        </p:txBody>
-      </p:sp>
-      <p:sp>
-        <p:nvSpPr>
-          <p:cNvPr id="206" name="Google Shape;206;p48"/>
-          <p:cNvSpPr txBox="1">
-            <a:spLocks noGrp="1"/>
-          </p:cNvSpPr>
-          <p:nvPr>
-            <p:ph type="title"/>
-          </p:nvPr>
-        </p:nvSpPr>
-        <p:spPr>
-          <a:xfrm>
-            <a:off x="500550" y="821219"/>
-            <a:ext cx="8520600" cy="1032900"/>
-          </a:xfrm>
-          <a:prstGeom prst="rect">
-            <a:avLst/>
-          </a:prstGeom>
-        </p:spPr>
-        <p:txBody>
-          <a:bodyPr spcFirstLastPara="1" wrap="square" lIns="91425" tIns="91425" rIns="91425" bIns="91425" anchor="t" anchorCtr="0">
-            <a:noAutofit/>
-          </a:bodyPr>
-          <a:lstStyle/>
-          <a:p>
-            <a:pPr marL="0" lvl="0" indent="0" algn="l" rtl="0">
-              <a:spcBef>
-                <a:spcPts val="0"/>
-              </a:spcBef>
-              <a:spcAft>
-                <a:spcPts val="0"/>
-              </a:spcAft>
-              <a:buClr>
-                <a:schemeClr val="dk1"/>
-              </a:buClr>
-              <a:buSzPts val="1100"/>
-              <a:buFont typeface="Arial"/>
-              <a:buNone/>
-            </a:pPr>
-            <a:r>
-              <a:rPr lang="en-US" dirty="0"/>
-              <a:t>Python </a:t>
-            </a:r>
-            <a:r>
-              <a:rPr lang="ru-RU" dirty="0"/>
-              <a:t>для аналитики</a:t>
-            </a:r>
-            <a:br>
-              <a:rPr lang="en-US" dirty="0"/>
-            </a:br>
-            <a:r>
-              <a:rPr lang="ru-RU" sz="3200" b="1" dirty="0">
-                <a:latin typeface="Roboto"/>
-                <a:ea typeface="Roboto"/>
-                <a:cs typeface="Roboto"/>
-                <a:sym typeface="Roboto"/>
-              </a:rPr>
-              <a:t>Основы статистики</a:t>
-            </a:r>
-            <a:endParaRPr dirty="0"/>
-          </a:p>
-        </p:txBody>
-      </p:sp>
-      <p:sp>
-        <p:nvSpPr>
-          <p:cNvPr id="207" name="Google Shape;207;p48"/>
-          <p:cNvSpPr txBox="1">
-            <a:spLocks noGrp="1"/>
-          </p:cNvSpPr>
-          <p:nvPr>
-            <p:ph type="subTitle" idx="1"/>
-          </p:nvPr>
-        </p:nvSpPr>
-        <p:spPr>
-          <a:xfrm>
-            <a:off x="500550" y="520133"/>
-            <a:ext cx="7796700" cy="356926"/>
-          </a:xfrm>
-          <a:prstGeom prst="rect">
-            <a:avLst/>
-          </a:prstGeom>
-        </p:spPr>
-        <p:txBody>
-          <a:bodyPr spcFirstLastPara="1" wrap="square" lIns="91425" tIns="91425" rIns="91425" bIns="91425" anchor="t" anchorCtr="0">
-            <a:normAutofit fontScale="92500" lnSpcReduction="20000"/>
-          </a:bodyPr>
-          <a:lstStyle/>
-          <a:p>
-            <a:pPr marL="0" lvl="0" indent="0" algn="l" rtl="0">
-              <a:spcBef>
-                <a:spcPts val="0"/>
-              </a:spcBef>
-              <a:spcAft>
-                <a:spcPts val="0"/>
-              </a:spcAft>
-              <a:buNone/>
-            </a:pPr>
-            <a:r>
-              <a:rPr lang="ru" dirty="0"/>
-              <a:t>Тема вебинара</a:t>
-            </a:r>
-            <a:endParaRPr dirty="0"/>
-          </a:p>
-        </p:txBody>
-      </p:sp>
-      <p:sp>
-        <p:nvSpPr>
-          <p:cNvPr id="208" name="Google Shape;208;p48"/>
-          <p:cNvSpPr txBox="1">
-            <a:spLocks noGrp="1"/>
-          </p:cNvSpPr>
-          <p:nvPr>
-            <p:ph type="subTitle" idx="2"/>
-          </p:nvPr>
-        </p:nvSpPr>
-        <p:spPr>
-          <a:xfrm>
-            <a:off x="3082400" y="2304911"/>
-            <a:ext cx="5856300" cy="396900"/>
-          </a:xfrm>
-          <a:prstGeom prst="rect">
-            <a:avLst/>
-          </a:prstGeom>
-        </p:spPr>
-        <p:txBody>
-          <a:bodyPr spcFirstLastPara="1" wrap="square" lIns="91425" tIns="91425" rIns="91425" bIns="91425" anchor="t" anchorCtr="0">
-            <a:normAutofit lnSpcReduction="10000"/>
-          </a:bodyPr>
-          <a:lstStyle/>
-          <a:p>
-            <a:pPr marL="0" lvl="0" indent="0" algn="l" rtl="0">
-              <a:spcBef>
-                <a:spcPts val="0"/>
-              </a:spcBef>
-              <a:spcAft>
-                <a:spcPts val="0"/>
-              </a:spcAft>
-              <a:buNone/>
-            </a:pPr>
-            <a:r>
-              <a:rPr lang="ru" dirty="0"/>
-              <a:t>Игорь Стурейко</a:t>
-            </a:r>
-            <a:endParaRPr dirty="0"/>
-          </a:p>
-        </p:txBody>
-      </p:sp>
-      <p:pic>
-        <p:nvPicPr>
-          <p:cNvPr id="3" name="Picture 2">
-            <a:extLst>
-              <a:ext uri="{FF2B5EF4-FFF2-40B4-BE49-F238E27FC236}">
-                <a16:creationId xmlns:a16="http://schemas.microsoft.com/office/drawing/2014/main" id="{522215E3-7B5E-BC4F-9DA6-F65D728D82F1}"/>
-              </a:ext>
-            </a:extLst>
-          </p:cNvPr>
-          <p:cNvPicPr>
-            <a:picLocks noChangeAspect="1"/>
-          </p:cNvPicPr>
-          <p:nvPr/>
-        </p:nvPicPr>
-        <p:blipFill rotWithShape="1">
-          <a:blip r:embed="rId3">
-            <a:extLst>
-              <a:ext uri="{28A0092B-C50C-407E-A947-70E740481C1C}">
-                <a14:useLocalDpi xmlns:a14="http://schemas.microsoft.com/office/drawing/2010/main" val="0"/>
-              </a:ext>
-            </a:extLst>
-          </a:blip>
-          <a:srcRect l="-1" t="12156" r="295"/>
-          <a:stretch/>
-        </p:blipFill>
-        <p:spPr>
-          <a:xfrm>
-            <a:off x="832654" y="2865544"/>
-            <a:ext cx="1662292" cy="1657372"/>
-          </a:xfrm>
-          <a:prstGeom prst="ellipse">
-            <a:avLst/>
-          </a:prstGeom>
-          <a:ln w="12700" cap="rnd">
-            <a:solidFill>
-              <a:srgbClr val="333333"/>
-            </a:solidFill>
-          </a:ln>
-          <a:effectLst>
-            <a:outerShdw blurRad="381000" dist="292100" dir="5400000" sx="-80000" sy="-18000" rotWithShape="0">
-              <a:srgbClr val="000000">
-                <a:alpha val="22000"/>
-              </a:srgbClr>
-            </a:outerShdw>
-          </a:effectLst>
-          <a:scene3d>
-            <a:camera prst="orthographicFront"/>
-            <a:lightRig rig="contrasting" dir="t">
-              <a:rot lat="0" lon="0" rev="3000000"/>
-            </a:lightRig>
-          </a:scene3d>
-          <a:sp3d contourW="7620">
-            <a:bevelT w="95250" h="31750"/>
-            <a:contourClr>
-              <a:srgbClr val="333333"/>
-            </a:contourClr>
-          </a:sp3d>
-        </p:spPr>
-      </p:pic>
-      <p:sp>
-        <p:nvSpPr>
-          <p:cNvPr id="10" name="Google Shape;209;p48">
-            <a:extLst>
-              <a:ext uri="{FF2B5EF4-FFF2-40B4-BE49-F238E27FC236}">
-                <a16:creationId xmlns:a16="http://schemas.microsoft.com/office/drawing/2014/main" id="{ED965473-BBD3-AB44-A950-B109F48DEFA0}"/>
-              </a:ext>
-            </a:extLst>
-          </p:cNvPr>
-          <p:cNvSpPr txBox="1">
-            <a:spLocks/>
-          </p:cNvSpPr>
-          <p:nvPr/>
-        </p:nvSpPr>
-        <p:spPr>
-          <a:xfrm>
-            <a:off x="3082400" y="2701811"/>
-            <a:ext cx="5938750" cy="2133660"/>
-          </a:xfrm>
-          <a:prstGeom prst="rect">
-            <a:avLst/>
-          </a:prstGeom>
-          <a:noFill/>
-          <a:ln>
-            <a:noFill/>
-          </a:ln>
-        </p:spPr>
-        <p:txBody>
-          <a:bodyPr spcFirstLastPara="1" wrap="square" lIns="91425" tIns="91425" rIns="91425" bIns="91425" anchor="t" anchorCtr="0">
-            <a:normAutofit fontScale="85000" lnSpcReduction="20000"/>
-          </a:bodyPr>
-          <a:lstStyle>
-            <a:lvl1pPr marL="0" lvl="0" algn="l">
-              <a:lnSpc>
-                <a:spcPct val="100000"/>
-              </a:lnSpc>
-              <a:spcBef>
-                <a:spcPts val="0"/>
-              </a:spcBef>
-              <a:spcAft>
-                <a:spcPts val="0"/>
-              </a:spcAft>
-              <a:buClr>
-                <a:schemeClr val="dk1"/>
-              </a:buClr>
-              <a:buSzPts val="1300"/>
-              <a:buNone/>
-              <a:defRPr sz="1300" b="0" i="0">
-                <a:solidFill>
-                  <a:schemeClr val="dk1"/>
-                </a:solidFill>
-                <a:latin typeface="+mn-lt"/>
-                <a:ea typeface="+mn-ea"/>
-                <a:cs typeface="+mn-cs"/>
-              </a:defRPr>
-            </a:lvl1pPr>
-            <a:lvl2pPr marL="457200" lvl="1" algn="l">
-              <a:lnSpc>
-                <a:spcPct val="100000"/>
-              </a:lnSpc>
-              <a:spcBef>
-                <a:spcPts val="0"/>
-              </a:spcBef>
-              <a:spcAft>
-                <a:spcPts val="0"/>
-              </a:spcAft>
-              <a:buClr>
-                <a:schemeClr val="dk1"/>
-              </a:buClr>
-              <a:buSzPts val="1500"/>
-              <a:buNone/>
-              <a:defRPr>
-                <a:solidFill>
-                  <a:schemeClr val="dk1"/>
-                </a:solidFill>
-                <a:latin typeface="+mn-lt"/>
-                <a:ea typeface="+mn-ea"/>
-                <a:cs typeface="+mn-cs"/>
-              </a:defRPr>
-            </a:lvl2pPr>
-            <a:lvl3pPr marL="914400" lvl="2" algn="l">
-              <a:lnSpc>
-                <a:spcPct val="100000"/>
-              </a:lnSpc>
-              <a:spcBef>
-                <a:spcPts val="0"/>
-              </a:spcBef>
-              <a:spcAft>
-                <a:spcPts val="0"/>
-              </a:spcAft>
-              <a:buClr>
-                <a:schemeClr val="dk1"/>
-              </a:buClr>
-              <a:buSzPts val="1300"/>
-              <a:buNone/>
-              <a:defRPr>
-                <a:solidFill>
-                  <a:schemeClr val="dk1"/>
-                </a:solidFill>
-                <a:latin typeface="+mn-lt"/>
-                <a:ea typeface="+mn-ea"/>
-                <a:cs typeface="+mn-cs"/>
-              </a:defRPr>
-            </a:lvl3pPr>
-            <a:lvl4pPr marL="1371600" lvl="3" algn="l">
-              <a:lnSpc>
-                <a:spcPct val="100000"/>
-              </a:lnSpc>
-              <a:spcBef>
-                <a:spcPts val="0"/>
-              </a:spcBef>
-              <a:spcAft>
-                <a:spcPts val="0"/>
-              </a:spcAft>
-              <a:buClr>
-                <a:schemeClr val="dk1"/>
-              </a:buClr>
-              <a:buSzPts val="1300"/>
-              <a:buNone/>
-              <a:defRPr>
-                <a:solidFill>
-                  <a:schemeClr val="dk1"/>
-                </a:solidFill>
-                <a:latin typeface="+mn-lt"/>
-                <a:ea typeface="+mn-ea"/>
-                <a:cs typeface="+mn-cs"/>
-              </a:defRPr>
-            </a:lvl4pPr>
-            <a:lvl5pPr marL="1828800" lvl="4" algn="l">
-              <a:lnSpc>
-                <a:spcPct val="100000"/>
-              </a:lnSpc>
-              <a:spcBef>
-                <a:spcPts val="0"/>
-              </a:spcBef>
-              <a:spcAft>
-                <a:spcPts val="0"/>
-              </a:spcAft>
-              <a:buClr>
-                <a:schemeClr val="dk1"/>
-              </a:buClr>
-              <a:buSzPts val="1300"/>
-              <a:buNone/>
-              <a:defRPr>
-                <a:solidFill>
-                  <a:schemeClr val="dk1"/>
-                </a:solidFill>
-                <a:latin typeface="+mn-lt"/>
-                <a:ea typeface="+mn-ea"/>
-                <a:cs typeface="+mn-cs"/>
-              </a:defRPr>
-            </a:lvl5pPr>
-            <a:lvl6pPr marL="2286000" lvl="5" algn="l">
-              <a:lnSpc>
-                <a:spcPct val="100000"/>
-              </a:lnSpc>
-              <a:spcBef>
-                <a:spcPts val="0"/>
-              </a:spcBef>
-              <a:spcAft>
-                <a:spcPts val="0"/>
-              </a:spcAft>
-              <a:buClr>
-                <a:schemeClr val="dk1"/>
-              </a:buClr>
-              <a:buSzPts val="1300"/>
-              <a:buNone/>
-              <a:defRPr>
-                <a:solidFill>
-                  <a:schemeClr val="dk1"/>
-                </a:solidFill>
-                <a:latin typeface="+mn-lt"/>
-                <a:ea typeface="+mn-ea"/>
-                <a:cs typeface="+mn-cs"/>
-              </a:defRPr>
-            </a:lvl6pPr>
-            <a:lvl7pPr marL="2743200" lvl="6" algn="l">
-              <a:lnSpc>
-                <a:spcPct val="100000"/>
-              </a:lnSpc>
-              <a:spcBef>
-                <a:spcPts val="0"/>
-              </a:spcBef>
-              <a:spcAft>
-                <a:spcPts val="0"/>
-              </a:spcAft>
-              <a:buClr>
-                <a:schemeClr val="dk1"/>
-              </a:buClr>
-              <a:buSzPts val="1300"/>
-              <a:buNone/>
-              <a:defRPr>
-                <a:solidFill>
-                  <a:schemeClr val="dk1"/>
-                </a:solidFill>
-                <a:latin typeface="+mn-lt"/>
-                <a:ea typeface="+mn-ea"/>
-                <a:cs typeface="+mn-cs"/>
-              </a:defRPr>
-            </a:lvl7pPr>
-            <a:lvl8pPr marL="3200400" lvl="7" algn="l">
-              <a:lnSpc>
-                <a:spcPct val="100000"/>
-              </a:lnSpc>
-              <a:spcBef>
-                <a:spcPts val="0"/>
-              </a:spcBef>
-              <a:spcAft>
-                <a:spcPts val="0"/>
-              </a:spcAft>
-              <a:buClr>
-                <a:schemeClr val="dk1"/>
-              </a:buClr>
-              <a:buSzPts val="1300"/>
-              <a:buNone/>
-              <a:defRPr>
-                <a:solidFill>
-                  <a:schemeClr val="dk1"/>
-                </a:solidFill>
-                <a:latin typeface="+mn-lt"/>
-                <a:ea typeface="+mn-ea"/>
-                <a:cs typeface="+mn-cs"/>
-              </a:defRPr>
-            </a:lvl8pPr>
-            <a:lvl9pPr marL="3657600" lvl="8" algn="l">
-              <a:lnSpc>
-                <a:spcPct val="100000"/>
-              </a:lnSpc>
-              <a:spcBef>
-                <a:spcPts val="0"/>
-              </a:spcBef>
-              <a:spcAft>
-                <a:spcPts val="0"/>
-              </a:spcAft>
-              <a:buClr>
-                <a:schemeClr val="dk1"/>
-              </a:buClr>
-              <a:buSzPts val="1300"/>
-              <a:buNone/>
-              <a:defRPr>
-                <a:solidFill>
-                  <a:schemeClr val="dk1"/>
-                </a:solidFill>
-                <a:latin typeface="+mn-lt"/>
-                <a:ea typeface="+mn-ea"/>
-                <a:cs typeface="+mn-cs"/>
-              </a:defRPr>
-            </a:lvl9pPr>
-          </a:lstStyle>
-          <a:p>
-            <a:pPr marL="1470025" indent="-1465263">
-              <a:tabLst>
-                <a:tab pos="1465263" algn="l"/>
-              </a:tabLst>
-            </a:pPr>
-            <a:r>
-              <a:rPr lang="ru-RU" sz="1150" b="1" kern="0" dirty="0"/>
-              <a:t>Руководитель курсов: </a:t>
-            </a:r>
-            <a:r>
-              <a:rPr lang="en-US" sz="1150" b="1" kern="0" dirty="0"/>
-              <a:t>	Reinforcement Learning, ML Professional, ML Basic, </a:t>
-            </a:r>
-            <a:br>
-              <a:rPr lang="en-US" sz="1150" b="1" kern="0" dirty="0"/>
-            </a:br>
-            <a:r>
-              <a:rPr lang="en-US" sz="1150" b="1" kern="0" dirty="0" err="1"/>
-              <a:t>MLOps</a:t>
-            </a:r>
-            <a:r>
-              <a:rPr lang="en-US" sz="1150" b="1" kern="0" dirty="0"/>
-              <a:t>, </a:t>
-            </a:r>
-            <a:r>
-              <a:rPr lang="en-US" sz="1150" b="1" kern="0" dirty="0" err="1"/>
-              <a:t>FinML</a:t>
-            </a:r>
-            <a:endParaRPr lang="en-US" sz="1150" b="1" kern="0" dirty="0"/>
-          </a:p>
-          <a:p>
-            <a:pPr rtl="0"/>
-            <a:endParaRPr lang="en-US" sz="1150" b="1" kern="0" dirty="0"/>
-          </a:p>
-          <a:p>
-            <a:pPr rtl="0"/>
-            <a:r>
-              <a:rPr lang="en-US" sz="1150" b="1" kern="0" dirty="0" err="1"/>
-              <a:t>Teamlead</a:t>
-            </a:r>
-            <a:endParaRPr lang="ru-RU" sz="1150" b="1" kern="0" dirty="0"/>
-          </a:p>
-          <a:p>
-            <a:pPr rtl="0"/>
-            <a:r>
-              <a:rPr lang="ru-RU" sz="1150" b="1" kern="0" dirty="0"/>
-              <a:t>Физический факультет МГУ, </a:t>
-            </a:r>
-            <a:r>
-              <a:rPr lang="en-US" sz="1150" b="1" kern="0" dirty="0"/>
-              <a:t>PhD </a:t>
-            </a:r>
-            <a:r>
-              <a:rPr lang="ru-RU" sz="1150" b="1" kern="0" dirty="0"/>
-              <a:t>теоретическая физика</a:t>
-            </a:r>
-          </a:p>
-          <a:p>
-            <a:pPr rtl="0"/>
-            <a:endParaRPr lang="ru-RU" sz="1150" kern="0" dirty="0"/>
-          </a:p>
-          <a:p>
-            <a:pPr rtl="0"/>
-            <a:r>
-              <a:rPr lang="ru-RU" sz="1150" b="1" kern="0" dirty="0"/>
-              <a:t>Опыт:</a:t>
-            </a:r>
-            <a:endParaRPr lang="ru-RU" sz="1150" kern="0" dirty="0"/>
-          </a:p>
-          <a:p>
-            <a:pPr rtl="0"/>
-            <a:r>
-              <a:rPr lang="ru-RU" sz="1150" kern="0" dirty="0"/>
-              <a:t>Более 15 лет занимался прикладной математикой и мат моделированием</a:t>
-            </a:r>
-          </a:p>
-          <a:p>
-            <a:pPr rtl="0"/>
-            <a:r>
-              <a:rPr lang="ru-RU" sz="1150" kern="0" dirty="0"/>
-              <a:t>(</a:t>
-            </a:r>
-            <a:r>
-              <a:rPr lang="en-US" sz="1150" kern="0" dirty="0"/>
-              <a:t>Data Scientist) (Python, </a:t>
-            </a:r>
-            <a:r>
-              <a:rPr lang="ru-RU" sz="1150" kern="0" dirty="0"/>
-              <a:t>С++)</a:t>
-            </a:r>
-          </a:p>
-          <a:p>
-            <a:pPr rtl="0"/>
-            <a:endParaRPr lang="ru-RU" sz="1150" kern="0" dirty="0"/>
-          </a:p>
-          <a:p>
-            <a:pPr rtl="0"/>
-            <a:endParaRPr lang="ru-RU" sz="1150" b="1" kern="0" dirty="0"/>
-          </a:p>
-          <a:p>
-            <a:pPr rtl="0"/>
-            <a:r>
-              <a:rPr lang="ru-RU" sz="1150" b="1" kern="0" dirty="0"/>
-              <a:t>@</a:t>
-            </a:r>
-            <a:r>
-              <a:rPr lang="en-US" sz="1150" b="1" kern="0" dirty="0" err="1"/>
-              <a:t>stureiko</a:t>
-            </a:r>
-            <a:r>
-              <a:rPr lang="en-US" sz="1150" b="1" kern="0" dirty="0"/>
-              <a:t> (TG)</a:t>
-            </a:r>
-          </a:p>
-          <a:p>
-            <a:pPr rtl="0"/>
-            <a:endParaRPr lang="en-US" sz="1150" b="1" kern="0" dirty="0"/>
-          </a:p>
-          <a:p>
-            <a:pPr rtl="0"/>
-            <a:r>
-              <a:rPr lang="en-US" sz="1150" b="1" kern="0" dirty="0"/>
-              <a:t>LinkedIn: </a:t>
-            </a:r>
-            <a:r>
-              <a:rPr lang="en-US" sz="1150" kern="0" dirty="0">
-                <a:hlinkClick r:id="rId4"/>
-              </a:rPr>
-              <a:t>igor-stureiko</a:t>
-            </a:r>
-            <a:r>
-              <a:rPr lang="en-US" sz="1150" kern="0" dirty="0"/>
-              <a:t> </a:t>
-            </a:r>
-          </a:p>
-          <a:p>
-            <a:pPr rtl="0"/>
-            <a:endParaRPr lang="en-US" sz="1150" kern="0" dirty="0"/>
-          </a:p>
-          <a:p>
-            <a:pPr rtl="0"/>
-            <a:r>
-              <a:rPr lang="en-US" sz="1150" b="1" kern="0" dirty="0"/>
-              <a:t>@</a:t>
-            </a:r>
-            <a:r>
-              <a:rPr lang="en-US" sz="1150" b="1" kern="0" dirty="0" err="1"/>
-              <a:t>rl_fintech</a:t>
-            </a:r>
-            <a:r>
-              <a:rPr lang="en-US" sz="1150" b="1" kern="0" dirty="0"/>
-              <a:t> </a:t>
-            </a:r>
-            <a:r>
-              <a:rPr lang="en-US" sz="1150" kern="0" dirty="0"/>
-              <a:t>(</a:t>
-            </a:r>
-            <a:r>
-              <a:rPr lang="ru-RU" sz="1150" kern="0" dirty="0"/>
-              <a:t>Мой канал о моделях в бизнесе)</a:t>
-            </a:r>
-            <a:endParaRPr lang="ru-RU" sz="1400" kern="0" dirty="0"/>
-          </a:p>
-        </p:txBody>
-      </p:sp>
-    </p:spTree>
-  </p:cSld>
-  <p:clrMapOvr>
-    <a:masterClrMapping/>
-  </p:clrMapOvr>
-</p:sld>
-</file>
-
-<file path=ppt/slides/slide30.xml><?xml version="1.0" encoding="utf-8"?>
-<p:sld xmlns:a="http://schemas.openxmlformats.org/drawingml/2006/main" xmlns:r="http://schemas.openxmlformats.org/officeDocument/2006/relationships" xmlns:p="http://schemas.openxmlformats.org/presentationml/2006/main">
-  <p:cSld>
-    <p:spTree>
-      <p:nvGrpSpPr>
-        <p:cNvPr id="1" name=""/>
-        <p:cNvGrpSpPr/>
-        <p:nvPr/>
-      </p:nvGrpSpPr>
-      <p:grpSpPr>
-        <a:xfrm>
-          <a:off x="0" y="0"/>
-          <a:ext cx="0" cy="0"/>
-          <a:chOff x="0" y="0"/>
-          <a:chExt cx="0" cy="0"/>
-        </a:xfrm>
-      </p:grpSpPr>
-      <p:sp>
-        <p:nvSpPr>
-          <p:cNvPr id="3" name="Title 2">
-            <a:extLst>
-              <a:ext uri="{FF2B5EF4-FFF2-40B4-BE49-F238E27FC236}">
-                <a16:creationId xmlns:a16="http://schemas.microsoft.com/office/drawing/2014/main" id="{5752C96D-D565-6E4E-BF35-7CF04C59F6DF}"/>
-              </a:ext>
-            </a:extLst>
-          </p:cNvPr>
-          <p:cNvSpPr>
-            <a:spLocks noGrp="1"/>
-          </p:cNvSpPr>
-          <p:nvPr>
-            <p:ph type="title"/>
-          </p:nvPr>
-        </p:nvSpPr>
-        <p:spPr/>
-        <p:txBody>
-          <a:bodyPr/>
-          <a:lstStyle/>
-          <a:p>
-            <a:r>
-              <a:rPr lang="ru-RU" dirty="0"/>
-              <a:t>Распределение Стьюдента</a:t>
-            </a:r>
-            <a:endParaRPr lang="en-US" dirty="0"/>
-          </a:p>
-        </p:txBody>
-      </p:sp>
-      <p:pic>
-        <p:nvPicPr>
-          <p:cNvPr id="2" name="Picture 1">
-            <a:extLst>
-              <a:ext uri="{FF2B5EF4-FFF2-40B4-BE49-F238E27FC236}">
-                <a16:creationId xmlns:a16="http://schemas.microsoft.com/office/drawing/2014/main" id="{BA1D78B6-F988-4C4F-B029-525414CFFC59}"/>
-              </a:ext>
-            </a:extLst>
-          </p:cNvPr>
-          <p:cNvPicPr>
-            <a:picLocks noChangeAspect="1"/>
-          </p:cNvPicPr>
-          <p:nvPr/>
-        </p:nvPicPr>
-        <p:blipFill>
-          <a:blip r:embed="rId2"/>
-          <a:stretch>
-            <a:fillRect/>
-          </a:stretch>
-        </p:blipFill>
-        <p:spPr>
-          <a:xfrm>
-            <a:off x="3652293" y="1581150"/>
-            <a:ext cx="5372100" cy="3454400"/>
-          </a:xfrm>
-          <a:prstGeom prst="rect">
-            <a:avLst/>
-          </a:prstGeom>
-        </p:spPr>
-      </p:pic>
-      <p:sp>
-        <p:nvSpPr>
-          <p:cNvPr id="4" name="TextBox 3">
-            <a:extLst>
-              <a:ext uri="{FF2B5EF4-FFF2-40B4-BE49-F238E27FC236}">
-                <a16:creationId xmlns:a16="http://schemas.microsoft.com/office/drawing/2014/main" id="{A3AA6B92-9D07-BF4B-AFC5-4A0BFB8E395A}"/>
-              </a:ext>
-            </a:extLst>
-          </p:cNvPr>
-          <p:cNvSpPr txBox="1"/>
-          <p:nvPr/>
-        </p:nvSpPr>
-        <p:spPr>
-          <a:xfrm>
-            <a:off x="457200" y="1581150"/>
-            <a:ext cx="3151743" cy="2585323"/>
-          </a:xfrm>
-          <a:prstGeom prst="rect">
-            <a:avLst/>
-          </a:prstGeom>
-          <a:noFill/>
-        </p:spPr>
-        <p:txBody>
-          <a:bodyPr wrap="square" rtlCol="0">
-            <a:spAutoFit/>
-          </a:bodyPr>
-          <a:lstStyle/>
-          <a:p>
-            <a:r>
-              <a:rPr lang="ru-RU" dirty="0"/>
-              <a:t>Вероятностное распределение, которое используется в статистике при анализе малых выборок, когда генеральная дисперсия неизвестна и выборочные данные предполагаются нормально распределёнными.</a:t>
-            </a:r>
-            <a:endParaRPr lang="en-US" dirty="0"/>
-          </a:p>
-        </p:txBody>
-      </p:sp>
-    </p:spTree>
-    <p:extLst>
-      <p:ext uri="{BB962C8B-B14F-4D97-AF65-F5344CB8AC3E}">
-        <p14:creationId xmlns:p14="http://schemas.microsoft.com/office/powerpoint/2010/main" val="4279835546"/>
-      </p:ext>
-    </p:extLst>
-  </p:cSld>
-  <p:clrMapOvr>
-    <a:masterClrMapping/>
-  </p:clrMapOvr>
-</p:sld>
-</file>
-
 <file path=ppt/slides/slide31.xml><?xml version="1.0" encoding="utf-8"?>
 <p:sld xmlns:a="http://schemas.openxmlformats.org/drawingml/2006/main" xmlns:r="http://schemas.openxmlformats.org/officeDocument/2006/relationships" xmlns:p="http://schemas.openxmlformats.org/presentationml/2006/main">
   <p:cSld>
@@ -12533,8 +12509,133 @@
           </a:p>
         </p:txBody>
       </p:sp>
-      <mc:AlternateContent xmlns:mc="http://schemas.openxmlformats.org/markup-compatibility/2006">
-        <mc:Choice xmlns:a14="http://schemas.microsoft.com/office/drawing/2010/main" Requires="a14">
+      <p:pic>
+        <p:nvPicPr>
+          <p:cNvPr id="2" name="Picture 1">
+            <a:extLst>
+              <a:ext uri="{FF2B5EF4-FFF2-40B4-BE49-F238E27FC236}">
+                <a16:creationId xmlns:a16="http://schemas.microsoft.com/office/drawing/2014/main" id="{BA1D78B6-F988-4C4F-B029-525414CFFC59}"/>
+              </a:ext>
+            </a:extLst>
+          </p:cNvPr>
+          <p:cNvPicPr>
+            <a:picLocks noChangeAspect="1"/>
+          </p:cNvPicPr>
+          <p:nvPr/>
+        </p:nvPicPr>
+        <p:blipFill>
+          <a:blip r:embed="rId2"/>
+          <a:stretch>
+            <a:fillRect/>
+          </a:stretch>
+        </p:blipFill>
+        <p:spPr>
+          <a:xfrm>
+            <a:off x="3652293" y="1581150"/>
+            <a:ext cx="5372100" cy="3454400"/>
+          </a:xfrm>
+          <a:prstGeom prst="rect">
+            <a:avLst/>
+          </a:prstGeom>
+        </p:spPr>
+      </p:pic>
+      <p:sp>
+        <p:nvSpPr>
+          <p:cNvPr id="4" name="TextBox 3">
+            <a:extLst>
+              <a:ext uri="{FF2B5EF4-FFF2-40B4-BE49-F238E27FC236}">
+                <a16:creationId xmlns:a16="http://schemas.microsoft.com/office/drawing/2014/main" id="{A3AA6B92-9D07-BF4B-AFC5-4A0BFB8E395A}"/>
+              </a:ext>
+            </a:extLst>
+          </p:cNvPr>
+          <p:cNvSpPr txBox="1"/>
+          <p:nvPr/>
+        </p:nvSpPr>
+        <p:spPr>
+          <a:xfrm>
+            <a:off x="457200" y="1581150"/>
+            <a:ext cx="3151743" cy="2585323"/>
+          </a:xfrm>
+          <a:prstGeom prst="rect">
+            <a:avLst/>
+          </a:prstGeom>
+          <a:noFill/>
+        </p:spPr>
+        <p:txBody>
+          <a:bodyPr wrap="square" rtlCol="0">
+            <a:spAutoFit/>
+          </a:bodyPr>
+          <a:lstStyle/>
+          <a:p>
+            <a:r>
+              <a:rPr lang="ru-RU" dirty="0"/>
+              <a:t>Вероятностное распределение, которое используется в статистике при анализе малых выборок, когда генеральная дисперсия неизвестна и выборочные данные предполагаются нормально распределёнными.</a:t>
+            </a:r>
+            <a:endParaRPr lang="en-US" dirty="0"/>
+          </a:p>
+        </p:txBody>
+      </p:sp>
+    </p:spTree>
+    <p:extLst>
+      <p:ext uri="{BB962C8B-B14F-4D97-AF65-F5344CB8AC3E}">
+        <p14:creationId xmlns:p14="http://schemas.microsoft.com/office/powerpoint/2010/main" val="4279835546"/>
+      </p:ext>
+    </p:extLst>
+  </p:cSld>
+  <p:clrMapOvr>
+    <a:masterClrMapping/>
+  </p:clrMapOvr>
+</p:sld>
+</file>
+
+<file path=ppt/slides/slide32.xml><?xml version="1.0" encoding="utf-8"?>
+<p:sld xmlns:a="http://schemas.openxmlformats.org/drawingml/2006/main" xmlns:r="http://schemas.openxmlformats.org/officeDocument/2006/relationships" xmlns:p="http://schemas.openxmlformats.org/presentationml/2006/main">
+  <p:cSld>
+    <p:spTree>
+      <p:nvGrpSpPr>
+        <p:cNvPr id="1" name=""/>
+        <p:cNvGrpSpPr/>
+        <p:nvPr/>
+      </p:nvGrpSpPr>
+      <p:grpSpPr>
+        <a:xfrm>
+          <a:off x="0" y="0"/>
+          <a:ext cx="0" cy="0"/>
+          <a:chOff x="0" y="0"/>
+          <a:chExt cx="0" cy="0"/>
+        </a:xfrm>
+      </p:grpSpPr>
+      <p:sp>
+        <p:nvSpPr>
+          <p:cNvPr id="3" name="Title 2">
+            <a:extLst>
+              <a:ext uri="{FF2B5EF4-FFF2-40B4-BE49-F238E27FC236}">
+                <a16:creationId xmlns:a16="http://schemas.microsoft.com/office/drawing/2014/main" id="{5752C96D-D565-6E4E-BF35-7CF04C59F6DF}"/>
+              </a:ext>
+            </a:extLst>
+          </p:cNvPr>
+          <p:cNvSpPr>
+            <a:spLocks noGrp="1"/>
+          </p:cNvSpPr>
+          <p:nvPr>
+            <p:ph type="title"/>
+          </p:nvPr>
+        </p:nvSpPr>
+        <p:spPr/>
+        <p:txBody>
+          <a:bodyPr/>
+          <a:lstStyle/>
+          <a:p>
+            <a:r>
+              <a:rPr lang="ru-RU" dirty="0"/>
+              <a:t>Распределение Стьюдента</a:t>
+            </a:r>
+            <a:endParaRPr lang="en-US" dirty="0"/>
+          </a:p>
+        </p:txBody>
+      </p:sp>
+      <mc:AlternateContent xmlns:mc="http://schemas.openxmlformats.org/markup-compatibility/2006" xmlns:a14="http://schemas.microsoft.com/office/drawing/2010/main">
+        <mc:Choice Requires="a14">
           <p:sp>
             <p:nvSpPr>
               <p:cNvPr id="4" name="TextBox 3">
@@ -12632,7 +12733,7 @@
             </p:txBody>
           </p:sp>
         </mc:Choice>
-        <mc:Fallback>
+        <mc:Fallback xmlns="">
           <p:sp>
             <p:nvSpPr>
               <p:cNvPr id="4" name="TextBox 3">
@@ -12690,203 +12791,6 @@
 </p:sld>
 </file>
 
-<file path=ppt/slides/slide32.xml><?xml version="1.0" encoding="utf-8"?>
-<p:sld xmlns:a="http://schemas.openxmlformats.org/drawingml/2006/main" xmlns:r="http://schemas.openxmlformats.org/officeDocument/2006/relationships" xmlns:p="http://schemas.openxmlformats.org/presentationml/2006/main">
-  <p:cSld>
-    <p:spTree>
-      <p:nvGrpSpPr>
-        <p:cNvPr id="1" name=""/>
-        <p:cNvGrpSpPr/>
-        <p:nvPr/>
-      </p:nvGrpSpPr>
-      <p:grpSpPr>
-        <a:xfrm>
-          <a:off x="0" y="0"/>
-          <a:ext cx="0" cy="0"/>
-          <a:chOff x="0" y="0"/>
-          <a:chExt cx="0" cy="0"/>
-        </a:xfrm>
-      </p:grpSpPr>
-      <p:sp>
-        <p:nvSpPr>
-          <p:cNvPr id="3" name="Title 2">
-            <a:extLst>
-              <a:ext uri="{FF2B5EF4-FFF2-40B4-BE49-F238E27FC236}">
-                <a16:creationId xmlns:a16="http://schemas.microsoft.com/office/drawing/2014/main" id="{5752C96D-D565-6E4E-BF35-7CF04C59F6DF}"/>
-              </a:ext>
-            </a:extLst>
-          </p:cNvPr>
-          <p:cNvSpPr>
-            <a:spLocks noGrp="1"/>
-          </p:cNvSpPr>
-          <p:nvPr>
-            <p:ph type="title"/>
-          </p:nvPr>
-        </p:nvSpPr>
-        <p:spPr/>
-        <p:txBody>
-          <a:bodyPr/>
-          <a:lstStyle/>
-          <a:p>
-            <a:r>
-              <a:rPr lang="ru-RU" dirty="0"/>
-              <a:t>Биномиальное распределение</a:t>
-            </a:r>
-            <a:endParaRPr lang="en-US" dirty="0"/>
-          </a:p>
-        </p:txBody>
-      </p:sp>
-      <p:sp>
-        <p:nvSpPr>
-          <p:cNvPr id="4" name="TextBox 3">
-            <a:extLst>
-              <a:ext uri="{FF2B5EF4-FFF2-40B4-BE49-F238E27FC236}">
-                <a16:creationId xmlns:a16="http://schemas.microsoft.com/office/drawing/2014/main" id="{BA741675-6B46-5D4A-93C6-90E824251FDF}"/>
-              </a:ext>
-            </a:extLst>
-          </p:cNvPr>
-          <p:cNvSpPr txBox="1"/>
-          <p:nvPr/>
-        </p:nvSpPr>
-        <p:spPr>
-          <a:xfrm>
-            <a:off x="500550" y="1352550"/>
-            <a:ext cx="2895599" cy="3108543"/>
-          </a:xfrm>
-          <a:prstGeom prst="rect">
-            <a:avLst/>
-          </a:prstGeom>
-          <a:noFill/>
-        </p:spPr>
-        <p:txBody>
-          <a:bodyPr wrap="square" rtlCol="0">
-            <a:spAutoFit/>
-          </a:bodyPr>
-          <a:lstStyle/>
-          <a:p>
-            <a:r>
-              <a:rPr lang="ru-RU" sz="1400" dirty="0">
-                <a:solidFill>
-                  <a:srgbClr val="000000"/>
-                </a:solidFill>
-                <a:latin typeface="-webkit-standard"/>
-              </a:rPr>
-              <a:t>Д</a:t>
-            </a:r>
-            <a:r>
-              <a:rPr lang="ru-RU" sz="1400" b="0" i="0" u="none" strike="noStrike" dirty="0">
-                <a:solidFill>
-                  <a:srgbClr val="000000"/>
-                </a:solidFill>
-                <a:effectLst/>
-                <a:latin typeface="-webkit-standard"/>
-              </a:rPr>
-              <a:t>искретное вероятностное распределение, которое описывает количество успехов в серии независимых испытаний, где каждое испытание может иметь только два исхода: успех (с вероятностью </a:t>
-            </a:r>
-            <a:r>
-              <a:rPr lang="en-US" sz="1400" b="0" i="0" u="none" strike="noStrike" dirty="0">
-                <a:solidFill>
-                  <a:srgbClr val="000000"/>
-                </a:solidFill>
-                <a:effectLst/>
-                <a:latin typeface="-webkit-standard"/>
-              </a:rPr>
-              <a:t>p</a:t>
-            </a:r>
-            <a:r>
-              <a:rPr lang="ru-RU" sz="1400" b="0" i="0" u="none" strike="noStrike" dirty="0">
-                <a:solidFill>
-                  <a:srgbClr val="000000"/>
-                </a:solidFill>
-                <a:effectLst/>
-                <a:latin typeface="-webkit-standard"/>
-              </a:rPr>
-              <a:t> или неудача (с вероятностью (</a:t>
-            </a:r>
-            <a:r>
-              <a:rPr lang="en-US" sz="1400" b="0" i="0" u="none" strike="noStrike" dirty="0">
-                <a:solidFill>
-                  <a:srgbClr val="000000"/>
-                </a:solidFill>
-                <a:effectLst/>
-                <a:latin typeface="-webkit-standard"/>
-              </a:rPr>
-              <a:t>1−p). </a:t>
-            </a:r>
-            <a:endParaRPr lang="ru-RU" sz="1400" b="0" i="0" u="none" strike="noStrike" dirty="0">
-              <a:solidFill>
-                <a:srgbClr val="000000"/>
-              </a:solidFill>
-              <a:effectLst/>
-              <a:latin typeface="-webkit-standard"/>
-            </a:endParaRPr>
-          </a:p>
-          <a:p>
-            <a:endParaRPr lang="ru-RU" sz="1400" dirty="0">
-              <a:solidFill>
-                <a:srgbClr val="000000"/>
-              </a:solidFill>
-              <a:latin typeface="-webkit-standard"/>
-            </a:endParaRPr>
-          </a:p>
-          <a:p>
-            <a:r>
-              <a:rPr lang="ru-RU" sz="1400" b="0" i="0" u="none" strike="noStrike" dirty="0">
-                <a:solidFill>
-                  <a:srgbClr val="000000"/>
-                </a:solidFill>
-                <a:effectLst/>
-                <a:latin typeface="-webkit-standard"/>
-              </a:rPr>
-              <a:t>Это распределение моделирует ситуации, в которых одно и то же событие повторяется несколько раз с фиксированной вероятностью успеха.</a:t>
-            </a:r>
-            <a:endParaRPr lang="ru-RU" sz="1400" dirty="0"/>
-          </a:p>
-        </p:txBody>
-      </p:sp>
-      <p:pic>
-        <p:nvPicPr>
-          <p:cNvPr id="9" name="Picture 8">
-            <a:extLst>
-              <a:ext uri="{FF2B5EF4-FFF2-40B4-BE49-F238E27FC236}">
-                <a16:creationId xmlns:a16="http://schemas.microsoft.com/office/drawing/2014/main" id="{5D961234-54CC-4E4D-98DC-11E1AFECDD68}"/>
-              </a:ext>
-            </a:extLst>
-          </p:cNvPr>
-          <p:cNvPicPr>
-            <a:picLocks noChangeAspect="1"/>
-          </p:cNvPicPr>
-          <p:nvPr/>
-        </p:nvPicPr>
-        <p:blipFill>
-          <a:blip r:embed="rId2"/>
-          <a:stretch>
-            <a:fillRect/>
-          </a:stretch>
-        </p:blipFill>
-        <p:spPr>
-          <a:xfrm>
-            <a:off x="3622569" y="1581150"/>
-            <a:ext cx="5422900" cy="3467100"/>
-          </a:xfrm>
-          <a:prstGeom prst="rect">
-            <a:avLst/>
-          </a:prstGeom>
-        </p:spPr>
-      </p:pic>
-    </p:spTree>
-    <p:extLst>
-      <p:ext uri="{BB962C8B-B14F-4D97-AF65-F5344CB8AC3E}">
-        <p14:creationId xmlns:p14="http://schemas.microsoft.com/office/powerpoint/2010/main" val="505084954"/>
-      </p:ext>
-    </p:extLst>
-  </p:cSld>
-  <p:clrMapOvr>
-    <a:masterClrMapping/>
-  </p:clrMapOvr>
-</p:sld>
-</file>
-
 <file path=ppt/slides/slide33.xml><?xml version="1.0" encoding="utf-8"?>
 <p:sld xmlns:a="http://schemas.openxmlformats.org/drawingml/2006/main" xmlns:r="http://schemas.openxmlformats.org/officeDocument/2006/relationships" xmlns:p="http://schemas.openxmlformats.org/presentationml/2006/main">
   <p:cSld>
@@ -12927,14 +12831,211 @@
           <a:p>
             <a:r>
               <a:rPr lang="ru-RU" dirty="0"/>
-              <a:t>Распределение Пуассона</a:t>
+              <a:t>Биномиальное распределение</a:t>
             </a:r>
             <a:endParaRPr lang="en-US" dirty="0"/>
           </a:p>
         </p:txBody>
       </p:sp>
-      <mc:AlternateContent xmlns:mc="http://schemas.openxmlformats.org/markup-compatibility/2006">
-        <mc:Choice xmlns:a14="http://schemas.microsoft.com/office/drawing/2010/main" Requires="a14">
+      <p:sp>
+        <p:nvSpPr>
+          <p:cNvPr id="4" name="TextBox 3">
+            <a:extLst>
+              <a:ext uri="{FF2B5EF4-FFF2-40B4-BE49-F238E27FC236}">
+                <a16:creationId xmlns:a16="http://schemas.microsoft.com/office/drawing/2014/main" id="{BA741675-6B46-5D4A-93C6-90E824251FDF}"/>
+              </a:ext>
+            </a:extLst>
+          </p:cNvPr>
+          <p:cNvSpPr txBox="1"/>
+          <p:nvPr/>
+        </p:nvSpPr>
+        <p:spPr>
+          <a:xfrm>
+            <a:off x="500550" y="1352550"/>
+            <a:ext cx="2895599" cy="3108543"/>
+          </a:xfrm>
+          <a:prstGeom prst="rect">
+            <a:avLst/>
+          </a:prstGeom>
+          <a:noFill/>
+        </p:spPr>
+        <p:txBody>
+          <a:bodyPr wrap="square" rtlCol="0">
+            <a:spAutoFit/>
+          </a:bodyPr>
+          <a:lstStyle/>
+          <a:p>
+            <a:r>
+              <a:rPr lang="ru-RU" sz="1400" dirty="0">
+                <a:solidFill>
+                  <a:srgbClr val="000000"/>
+                </a:solidFill>
+                <a:latin typeface="-webkit-standard"/>
+              </a:rPr>
+              <a:t>Д</a:t>
+            </a:r>
+            <a:r>
+              <a:rPr lang="ru-RU" sz="1400" b="0" i="0" u="none" strike="noStrike" dirty="0">
+                <a:solidFill>
+                  <a:srgbClr val="000000"/>
+                </a:solidFill>
+                <a:effectLst/>
+                <a:latin typeface="-webkit-standard"/>
+              </a:rPr>
+              <a:t>искретное вероятностное распределение, которое описывает количество успехов в серии независимых испытаний, где каждое испытание может иметь только два исхода: успех (с вероятностью </a:t>
+            </a:r>
+            <a:r>
+              <a:rPr lang="en-US" sz="1400" b="0" i="0" u="none" strike="noStrike" dirty="0">
+                <a:solidFill>
+                  <a:srgbClr val="000000"/>
+                </a:solidFill>
+                <a:effectLst/>
+                <a:latin typeface="-webkit-standard"/>
+              </a:rPr>
+              <a:t>p</a:t>
+            </a:r>
+            <a:r>
+              <a:rPr lang="ru-RU" sz="1400" b="0" i="0" u="none" strike="noStrike" dirty="0">
+                <a:solidFill>
+                  <a:srgbClr val="000000"/>
+                </a:solidFill>
+                <a:effectLst/>
+                <a:latin typeface="-webkit-standard"/>
+              </a:rPr>
+              <a:t> или неудача (с вероятностью (</a:t>
+            </a:r>
+            <a:r>
+              <a:rPr lang="en-US" sz="1400" b="0" i="0" u="none" strike="noStrike" dirty="0">
+                <a:solidFill>
+                  <a:srgbClr val="000000"/>
+                </a:solidFill>
+                <a:effectLst/>
+                <a:latin typeface="-webkit-standard"/>
+              </a:rPr>
+              <a:t>1−p). </a:t>
+            </a:r>
+            <a:endParaRPr lang="ru-RU" sz="1400" b="0" i="0" u="none" strike="noStrike" dirty="0">
+              <a:solidFill>
+                <a:srgbClr val="000000"/>
+              </a:solidFill>
+              <a:effectLst/>
+              <a:latin typeface="-webkit-standard"/>
+            </a:endParaRPr>
+          </a:p>
+          <a:p>
+            <a:endParaRPr lang="ru-RU" sz="1400" dirty="0">
+              <a:solidFill>
+                <a:srgbClr val="000000"/>
+              </a:solidFill>
+              <a:latin typeface="-webkit-standard"/>
+            </a:endParaRPr>
+          </a:p>
+          <a:p>
+            <a:r>
+              <a:rPr lang="ru-RU" sz="1400" b="0" i="0" u="none" strike="noStrike" dirty="0">
+                <a:solidFill>
+                  <a:srgbClr val="000000"/>
+                </a:solidFill>
+                <a:effectLst/>
+                <a:latin typeface="-webkit-standard"/>
+              </a:rPr>
+              <a:t>Это распределение моделирует ситуации, в которых одно и то же событие повторяется несколько раз с фиксированной вероятностью успеха.</a:t>
+            </a:r>
+            <a:endParaRPr lang="ru-RU" sz="1400" dirty="0"/>
+          </a:p>
+        </p:txBody>
+      </p:sp>
+      <p:pic>
+        <p:nvPicPr>
+          <p:cNvPr id="9" name="Picture 8">
+            <a:extLst>
+              <a:ext uri="{FF2B5EF4-FFF2-40B4-BE49-F238E27FC236}">
+                <a16:creationId xmlns:a16="http://schemas.microsoft.com/office/drawing/2014/main" id="{5D961234-54CC-4E4D-98DC-11E1AFECDD68}"/>
+              </a:ext>
+            </a:extLst>
+          </p:cNvPr>
+          <p:cNvPicPr>
+            <a:picLocks noChangeAspect="1"/>
+          </p:cNvPicPr>
+          <p:nvPr/>
+        </p:nvPicPr>
+        <p:blipFill>
+          <a:blip r:embed="rId2"/>
+          <a:stretch>
+            <a:fillRect/>
+          </a:stretch>
+        </p:blipFill>
+        <p:spPr>
+          <a:xfrm>
+            <a:off x="3622569" y="1581150"/>
+            <a:ext cx="5422900" cy="3467100"/>
+          </a:xfrm>
+          <a:prstGeom prst="rect">
+            <a:avLst/>
+          </a:prstGeom>
+        </p:spPr>
+      </p:pic>
+    </p:spTree>
+    <p:extLst>
+      <p:ext uri="{BB962C8B-B14F-4D97-AF65-F5344CB8AC3E}">
+        <p14:creationId xmlns:p14="http://schemas.microsoft.com/office/powerpoint/2010/main" val="505084954"/>
+      </p:ext>
+    </p:extLst>
+  </p:cSld>
+  <p:clrMapOvr>
+    <a:masterClrMapping/>
+  </p:clrMapOvr>
+</p:sld>
+</file>
+
+<file path=ppt/slides/slide34.xml><?xml version="1.0" encoding="utf-8"?>
+<p:sld xmlns:a="http://schemas.openxmlformats.org/drawingml/2006/main" xmlns:r="http://schemas.openxmlformats.org/officeDocument/2006/relationships" xmlns:p="http://schemas.openxmlformats.org/presentationml/2006/main">
+  <p:cSld>
+    <p:spTree>
+      <p:nvGrpSpPr>
+        <p:cNvPr id="1" name=""/>
+        <p:cNvGrpSpPr/>
+        <p:nvPr/>
+      </p:nvGrpSpPr>
+      <p:grpSpPr>
+        <a:xfrm>
+          <a:off x="0" y="0"/>
+          <a:ext cx="0" cy="0"/>
+          <a:chOff x="0" y="0"/>
+          <a:chExt cx="0" cy="0"/>
+        </a:xfrm>
+      </p:grpSpPr>
+      <p:sp>
+        <p:nvSpPr>
+          <p:cNvPr id="3" name="Title 2">
+            <a:extLst>
+              <a:ext uri="{FF2B5EF4-FFF2-40B4-BE49-F238E27FC236}">
+                <a16:creationId xmlns:a16="http://schemas.microsoft.com/office/drawing/2014/main" id="{5752C96D-D565-6E4E-BF35-7CF04C59F6DF}"/>
+              </a:ext>
+            </a:extLst>
+          </p:cNvPr>
+          <p:cNvSpPr>
+            <a:spLocks noGrp="1"/>
+          </p:cNvSpPr>
+          <p:nvPr>
+            <p:ph type="title"/>
+          </p:nvPr>
+        </p:nvSpPr>
+        <p:spPr/>
+        <p:txBody>
+          <a:bodyPr/>
+          <a:lstStyle/>
+          <a:p>
+            <a:r>
+              <a:rPr lang="ru-RU" dirty="0"/>
+              <a:t>Распределение Пуассона</a:t>
+            </a:r>
+            <a:endParaRPr lang="en-US" dirty="0"/>
+          </a:p>
+        </p:txBody>
+      </p:sp>
+      <mc:AlternateContent xmlns:mc="http://schemas.openxmlformats.org/markup-compatibility/2006" xmlns:a14="http://schemas.microsoft.com/office/drawing/2010/main">
+        <mc:Choice Requires="a14">
           <p:sp>
             <p:nvSpPr>
               <p:cNvPr id="4" name="TextBox 3">
@@ -13029,7 +13130,7 @@
             </p:txBody>
           </p:sp>
         </mc:Choice>
-        <mc:Fallback>
+        <mc:Fallback xmlns="">
           <p:sp>
             <p:nvSpPr>
               <p:cNvPr id="4" name="TextBox 3">
@@ -13117,7 +13218,7 @@
 </p:sld>
 </file>
 
-<file path=ppt/slides/slide34.xml><?xml version="1.0" encoding="utf-8"?>
+<file path=ppt/slides/slide35.xml><?xml version="1.0" encoding="utf-8"?>
 <p:sld xmlns:a="http://schemas.openxmlformats.org/drawingml/2006/main" xmlns:r="http://schemas.openxmlformats.org/officeDocument/2006/relationships" xmlns:p="http://schemas.openxmlformats.org/presentationml/2006/main">
   <p:cSld>
     <p:spTree>
@@ -13271,7 +13372,7 @@
 </p:sld>
 </file>
 
-<file path=ppt/slides/slide35.xml><?xml version="1.0" encoding="utf-8"?>
+<file path=ppt/slides/slide36.xml><?xml version="1.0" encoding="utf-8"?>
 <p:sld xmlns:a="http://schemas.openxmlformats.org/drawingml/2006/main" xmlns:r="http://schemas.openxmlformats.org/officeDocument/2006/relationships" xmlns:p="http://schemas.openxmlformats.org/presentationml/2006/main">
   <p:cSld>
     <p:spTree>
@@ -13659,7 +13760,7 @@
 </p:sld>
 </file>
 
-<file path=ppt/slides/slide36.xml><?xml version="1.0" encoding="utf-8"?>
+<file path=ppt/slides/slide37.xml><?xml version="1.0" encoding="utf-8"?>
 <p:sld xmlns:a="http://schemas.openxmlformats.org/drawingml/2006/main" xmlns:r="http://schemas.openxmlformats.org/officeDocument/2006/relationships" xmlns:p="http://schemas.openxmlformats.org/presentationml/2006/main">
   <p:cSld>
     <p:spTree>
@@ -13734,7 +13835,7 @@
 </p:sld>
 </file>
 
-<file path=ppt/slides/slide37.xml><?xml version="1.0" encoding="utf-8"?>
+<file path=ppt/slides/slide38.xml><?xml version="1.0" encoding="utf-8"?>
 <p:sld xmlns:a="http://schemas.openxmlformats.org/drawingml/2006/main" xmlns:r="http://schemas.openxmlformats.org/officeDocument/2006/relationships" xmlns:p="http://schemas.openxmlformats.org/presentationml/2006/main">
   <p:cSld>
     <p:spTree>
@@ -14329,7 +14430,7 @@
 </p:sld>
 </file>
 
-<file path=ppt/slides/slide38.xml><?xml version="1.0" encoding="utf-8"?>
+<file path=ppt/slides/slide39.xml><?xml version="1.0" encoding="utf-8"?>
 <p:sld xmlns:a="http://schemas.openxmlformats.org/drawingml/2006/main" xmlns:r="http://schemas.openxmlformats.org/officeDocument/2006/relationships" xmlns:p="http://schemas.openxmlformats.org/presentationml/2006/main">
   <p:cSld>
     <p:spTree>
@@ -14710,224 +14811,6 @@
         <p14:creationId xmlns:p14="http://schemas.microsoft.com/office/powerpoint/2010/main" val="775738295"/>
       </p:ext>
     </p:extLst>
-  </p:cSld>
-  <p:clrMapOvr>
-    <a:masterClrMapping/>
-  </p:clrMapOvr>
-</p:sld>
-</file>
-
-<file path=ppt/slides/slide39.xml><?xml version="1.0" encoding="utf-8"?>
-<p:sld xmlns:a="http://schemas.openxmlformats.org/drawingml/2006/main" xmlns:r="http://schemas.openxmlformats.org/officeDocument/2006/relationships" xmlns:p="http://schemas.openxmlformats.org/presentationml/2006/main">
-  <p:cSld>
-    <p:spTree>
-      <p:nvGrpSpPr>
-        <p:cNvPr id="1" name="Shape 406"/>
-        <p:cNvGrpSpPr/>
-        <p:nvPr/>
-      </p:nvGrpSpPr>
-      <p:grpSpPr>
-        <a:xfrm>
-          <a:off x="0" y="0"/>
-          <a:ext cx="0" cy="0"/>
-          <a:chOff x="0" y="0"/>
-          <a:chExt cx="0" cy="0"/>
-        </a:xfrm>
-      </p:grpSpPr>
-      <p:sp>
-        <p:nvSpPr>
-          <p:cNvPr id="407" name="Google Shape;407;p71"/>
-          <p:cNvSpPr txBox="1">
-            <a:spLocks noGrp="1"/>
-          </p:cNvSpPr>
-          <p:nvPr>
-            <p:ph type="title"/>
-          </p:nvPr>
-        </p:nvSpPr>
-        <p:spPr>
-          <a:xfrm>
-            <a:off x="500550" y="330724"/>
-            <a:ext cx="8520600" cy="1095900"/>
-          </a:xfrm>
-          <a:prstGeom prst="rect">
-            <a:avLst/>
-          </a:prstGeom>
-        </p:spPr>
-        <p:txBody>
-          <a:bodyPr spcFirstLastPara="1" wrap="square" lIns="91425" tIns="91425" rIns="91425" bIns="91425" anchor="t" anchorCtr="0">
-            <a:noAutofit/>
-          </a:bodyPr>
-          <a:lstStyle/>
-          <a:p>
-            <a:pPr marL="0" lvl="0" indent="0" algn="l" rtl="0">
-              <a:spcBef>
-                <a:spcPts val="0"/>
-              </a:spcBef>
-              <a:spcAft>
-                <a:spcPts val="0"/>
-              </a:spcAft>
-              <a:buNone/>
-            </a:pPr>
-            <a:r>
-              <a:rPr lang="ru" dirty="0"/>
-              <a:t>Список материалов для изучения</a:t>
-            </a:r>
-            <a:endParaRPr dirty="0"/>
-          </a:p>
-        </p:txBody>
-      </p:sp>
-      <p:sp>
-        <p:nvSpPr>
-          <p:cNvPr id="408" name="Google Shape;408;p71"/>
-          <p:cNvSpPr txBox="1">
-            <a:spLocks noGrp="1"/>
-          </p:cNvSpPr>
-          <p:nvPr>
-            <p:ph type="body" idx="4294967295"/>
-          </p:nvPr>
-        </p:nvSpPr>
-        <p:spPr>
-          <a:xfrm>
-            <a:off x="381000" y="895350"/>
-            <a:ext cx="8610600" cy="3962400"/>
-          </a:xfrm>
-          <a:prstGeom prst="rect">
-            <a:avLst/>
-          </a:prstGeom>
-        </p:spPr>
-        <p:txBody>
-          <a:bodyPr spcFirstLastPara="1" wrap="square" lIns="91425" tIns="91425" rIns="91425" bIns="91425" anchor="t" anchorCtr="0">
-            <a:normAutofit/>
-          </a:bodyPr>
-          <a:lstStyle/>
-          <a:p>
-            <a:pPr marL="457200" indent="-311150" algn="l" rtl="0">
-              <a:lnSpc>
-                <a:spcPct val="100000"/>
-              </a:lnSpc>
-              <a:spcAft>
-                <a:spcPts val="1200"/>
-              </a:spcAft>
-              <a:buSzPct val="100000"/>
-              <a:buAutoNum type="arabicPeriod"/>
-            </a:pPr>
-            <a:endParaRPr lang="en-US" dirty="0"/>
-          </a:p>
-          <a:p>
-            <a:pPr marL="457200" indent="-311150" algn="l" rtl="0">
-              <a:lnSpc>
-                <a:spcPct val="100000"/>
-              </a:lnSpc>
-              <a:spcAft>
-                <a:spcPts val="1200"/>
-              </a:spcAft>
-              <a:buSzPct val="100000"/>
-              <a:buAutoNum type="arabicPeriod"/>
-            </a:pPr>
-            <a:r>
-              <a:rPr lang="ru-RU" dirty="0"/>
-              <a:t>Статистика для всех. Сара </a:t>
-            </a:r>
-            <a:r>
-              <a:rPr lang="ru-RU" dirty="0" err="1"/>
-              <a:t>Бослаф</a:t>
-            </a:r>
-            <a:endParaRPr lang="ru-RU" dirty="0"/>
-          </a:p>
-          <a:p>
-            <a:pPr marL="457200" indent="-311150" algn="l" rtl="0">
-              <a:lnSpc>
-                <a:spcPct val="100000"/>
-              </a:lnSpc>
-              <a:spcAft>
-                <a:spcPts val="1200"/>
-              </a:spcAft>
-              <a:buSzPct val="100000"/>
-              <a:buAutoNum type="arabicPeriod"/>
-            </a:pPr>
-            <a:r>
-              <a:rPr lang="ru-RU" dirty="0"/>
-              <a:t>Статистика и котики. Владимир Савельев</a:t>
-            </a:r>
-          </a:p>
-          <a:p>
-            <a:pPr marL="457200" indent="-311150" algn="l" rtl="0">
-              <a:lnSpc>
-                <a:spcPct val="100000"/>
-              </a:lnSpc>
-              <a:spcAft>
-                <a:spcPts val="1200"/>
-              </a:spcAft>
-              <a:buSzPct val="100000"/>
-              <a:buAutoNum type="arabicPeriod"/>
-            </a:pPr>
-            <a:r>
-              <a:rPr lang="ru-RU" dirty="0"/>
-              <a:t>Голая статистика. Чарльз </a:t>
-            </a:r>
-            <a:r>
-              <a:rPr lang="ru-RU" dirty="0" err="1"/>
-              <a:t>Уилан</a:t>
-            </a:r>
-            <a:endParaRPr lang="ru-RU" dirty="0"/>
-          </a:p>
-          <a:p>
-            <a:pPr marL="457200" indent="-311150" algn="l" rtl="0">
-              <a:lnSpc>
-                <a:spcPct val="100000"/>
-              </a:lnSpc>
-              <a:spcAft>
-                <a:spcPts val="1200"/>
-              </a:spcAft>
-              <a:buSzPct val="100000"/>
-              <a:buAutoNum type="arabicPeriod"/>
-            </a:pPr>
-            <a:r>
-              <a:rPr lang="ru-RU" dirty="0"/>
-              <a:t>Как лгать при помощи статистики. </a:t>
-            </a:r>
-            <a:r>
-              <a:rPr lang="ru-RU" dirty="0" err="1"/>
-              <a:t>Дарелл</a:t>
-            </a:r>
-            <a:r>
-              <a:rPr lang="ru-RU" dirty="0"/>
-              <a:t> </a:t>
-            </a:r>
-            <a:r>
-              <a:rPr lang="ru-RU" dirty="0" err="1"/>
-              <a:t>Хафф</a:t>
-            </a:r>
-            <a:endParaRPr lang="ru-RU" dirty="0"/>
-          </a:p>
-          <a:p>
-            <a:pPr marL="457200" indent="-311150" algn="l" rtl="0">
-              <a:lnSpc>
-                <a:spcPct val="100000"/>
-              </a:lnSpc>
-              <a:spcAft>
-                <a:spcPts val="1200"/>
-              </a:spcAft>
-              <a:buSzPct val="100000"/>
-              <a:buAutoNum type="arabicPeriod"/>
-            </a:pPr>
-            <a:r>
-              <a:rPr lang="ru-RU" dirty="0"/>
-              <a:t>Статистика. Шаг за шагом. Роберт А. </a:t>
-            </a:r>
-            <a:r>
-              <a:rPr lang="ru-RU" dirty="0" err="1"/>
-              <a:t>Доннелли</a:t>
-            </a:r>
-            <a:r>
-              <a:rPr lang="ru-RU" dirty="0"/>
-              <a:t> - мл</a:t>
-            </a:r>
-            <a:endParaRPr lang="en-GB" dirty="0"/>
-          </a:p>
-        </p:txBody>
-      </p:sp>
-    </p:spTree>
   </p:cSld>
   <p:clrMapOvr>
     <a:masterClrMapping/>
@@ -15890,6 +15773,224 @@
   <p:cSld>
     <p:spTree>
       <p:nvGrpSpPr>
+        <p:cNvPr id="1" name="Shape 406"/>
+        <p:cNvGrpSpPr/>
+        <p:nvPr/>
+      </p:nvGrpSpPr>
+      <p:grpSpPr>
+        <a:xfrm>
+          <a:off x="0" y="0"/>
+          <a:ext cx="0" cy="0"/>
+          <a:chOff x="0" y="0"/>
+          <a:chExt cx="0" cy="0"/>
+        </a:xfrm>
+      </p:grpSpPr>
+      <p:sp>
+        <p:nvSpPr>
+          <p:cNvPr id="407" name="Google Shape;407;p71"/>
+          <p:cNvSpPr txBox="1">
+            <a:spLocks noGrp="1"/>
+          </p:cNvSpPr>
+          <p:nvPr>
+            <p:ph type="title"/>
+          </p:nvPr>
+        </p:nvSpPr>
+        <p:spPr>
+          <a:xfrm>
+            <a:off x="500550" y="330724"/>
+            <a:ext cx="8520600" cy="1095900"/>
+          </a:xfrm>
+          <a:prstGeom prst="rect">
+            <a:avLst/>
+          </a:prstGeom>
+        </p:spPr>
+        <p:txBody>
+          <a:bodyPr spcFirstLastPara="1" wrap="square" lIns="91425" tIns="91425" rIns="91425" bIns="91425" anchor="t" anchorCtr="0">
+            <a:noAutofit/>
+          </a:bodyPr>
+          <a:lstStyle/>
+          <a:p>
+            <a:pPr marL="0" lvl="0" indent="0" algn="l" rtl="0">
+              <a:spcBef>
+                <a:spcPts val="0"/>
+              </a:spcBef>
+              <a:spcAft>
+                <a:spcPts val="0"/>
+              </a:spcAft>
+              <a:buNone/>
+            </a:pPr>
+            <a:r>
+              <a:rPr lang="ru" dirty="0"/>
+              <a:t>Список материалов для изучения</a:t>
+            </a:r>
+            <a:endParaRPr dirty="0"/>
+          </a:p>
+        </p:txBody>
+      </p:sp>
+      <p:sp>
+        <p:nvSpPr>
+          <p:cNvPr id="408" name="Google Shape;408;p71"/>
+          <p:cNvSpPr txBox="1">
+            <a:spLocks noGrp="1"/>
+          </p:cNvSpPr>
+          <p:nvPr>
+            <p:ph type="body" idx="4294967295"/>
+          </p:nvPr>
+        </p:nvSpPr>
+        <p:spPr>
+          <a:xfrm>
+            <a:off x="381000" y="895350"/>
+            <a:ext cx="8610600" cy="3962400"/>
+          </a:xfrm>
+          <a:prstGeom prst="rect">
+            <a:avLst/>
+          </a:prstGeom>
+        </p:spPr>
+        <p:txBody>
+          <a:bodyPr spcFirstLastPara="1" wrap="square" lIns="91425" tIns="91425" rIns="91425" bIns="91425" anchor="t" anchorCtr="0">
+            <a:normAutofit/>
+          </a:bodyPr>
+          <a:lstStyle/>
+          <a:p>
+            <a:pPr marL="457200" indent="-311150" algn="l" rtl="0">
+              <a:lnSpc>
+                <a:spcPct val="100000"/>
+              </a:lnSpc>
+              <a:spcAft>
+                <a:spcPts val="1200"/>
+              </a:spcAft>
+              <a:buSzPct val="100000"/>
+              <a:buAutoNum type="arabicPeriod"/>
+            </a:pPr>
+            <a:endParaRPr lang="en-US" dirty="0"/>
+          </a:p>
+          <a:p>
+            <a:pPr marL="457200" indent="-311150" algn="l" rtl="0">
+              <a:lnSpc>
+                <a:spcPct val="100000"/>
+              </a:lnSpc>
+              <a:spcAft>
+                <a:spcPts val="1200"/>
+              </a:spcAft>
+              <a:buSzPct val="100000"/>
+              <a:buAutoNum type="arabicPeriod"/>
+            </a:pPr>
+            <a:r>
+              <a:rPr lang="ru-RU" dirty="0"/>
+              <a:t>Статистика для всех. Сара </a:t>
+            </a:r>
+            <a:r>
+              <a:rPr lang="ru-RU" dirty="0" err="1"/>
+              <a:t>Бослаф</a:t>
+            </a:r>
+            <a:endParaRPr lang="ru-RU" dirty="0"/>
+          </a:p>
+          <a:p>
+            <a:pPr marL="457200" indent="-311150" algn="l" rtl="0">
+              <a:lnSpc>
+                <a:spcPct val="100000"/>
+              </a:lnSpc>
+              <a:spcAft>
+                <a:spcPts val="1200"/>
+              </a:spcAft>
+              <a:buSzPct val="100000"/>
+              <a:buAutoNum type="arabicPeriod"/>
+            </a:pPr>
+            <a:r>
+              <a:rPr lang="ru-RU" dirty="0"/>
+              <a:t>Статистика и котики. Владимир Савельев</a:t>
+            </a:r>
+          </a:p>
+          <a:p>
+            <a:pPr marL="457200" indent="-311150" algn="l" rtl="0">
+              <a:lnSpc>
+                <a:spcPct val="100000"/>
+              </a:lnSpc>
+              <a:spcAft>
+                <a:spcPts val="1200"/>
+              </a:spcAft>
+              <a:buSzPct val="100000"/>
+              <a:buAutoNum type="arabicPeriod"/>
+            </a:pPr>
+            <a:r>
+              <a:rPr lang="ru-RU" dirty="0"/>
+              <a:t>Голая статистика. Чарльз </a:t>
+            </a:r>
+            <a:r>
+              <a:rPr lang="ru-RU" dirty="0" err="1"/>
+              <a:t>Уилан</a:t>
+            </a:r>
+            <a:endParaRPr lang="ru-RU" dirty="0"/>
+          </a:p>
+          <a:p>
+            <a:pPr marL="457200" indent="-311150" algn="l" rtl="0">
+              <a:lnSpc>
+                <a:spcPct val="100000"/>
+              </a:lnSpc>
+              <a:spcAft>
+                <a:spcPts val="1200"/>
+              </a:spcAft>
+              <a:buSzPct val="100000"/>
+              <a:buAutoNum type="arabicPeriod"/>
+            </a:pPr>
+            <a:r>
+              <a:rPr lang="ru-RU" dirty="0"/>
+              <a:t>Как лгать при помощи статистики. </a:t>
+            </a:r>
+            <a:r>
+              <a:rPr lang="ru-RU" dirty="0" err="1"/>
+              <a:t>Дарелл</a:t>
+            </a:r>
+            <a:r>
+              <a:rPr lang="ru-RU" dirty="0"/>
+              <a:t> </a:t>
+            </a:r>
+            <a:r>
+              <a:rPr lang="ru-RU" dirty="0" err="1"/>
+              <a:t>Хафф</a:t>
+            </a:r>
+            <a:endParaRPr lang="ru-RU" dirty="0"/>
+          </a:p>
+          <a:p>
+            <a:pPr marL="457200" indent="-311150" algn="l" rtl="0">
+              <a:lnSpc>
+                <a:spcPct val="100000"/>
+              </a:lnSpc>
+              <a:spcAft>
+                <a:spcPts val="1200"/>
+              </a:spcAft>
+              <a:buSzPct val="100000"/>
+              <a:buAutoNum type="arabicPeriod"/>
+            </a:pPr>
+            <a:r>
+              <a:rPr lang="ru-RU" dirty="0"/>
+              <a:t>Статистика. Шаг за шагом. Роберт А. </a:t>
+            </a:r>
+            <a:r>
+              <a:rPr lang="ru-RU" dirty="0" err="1"/>
+              <a:t>Доннелли</a:t>
+            </a:r>
+            <a:r>
+              <a:rPr lang="ru-RU" dirty="0"/>
+              <a:t> - мл</a:t>
+            </a:r>
+            <a:endParaRPr lang="en-GB" dirty="0"/>
+          </a:p>
+        </p:txBody>
+      </p:sp>
+    </p:spTree>
+  </p:cSld>
+  <p:clrMapOvr>
+    <a:masterClrMapping/>
+  </p:clrMapOvr>
+</p:sld>
+</file>
+
+<file path=ppt/slides/slide41.xml><?xml version="1.0" encoding="utf-8"?>
+<p:sld xmlns:a="http://schemas.openxmlformats.org/drawingml/2006/main" xmlns:r="http://schemas.openxmlformats.org/officeDocument/2006/relationships" xmlns:p="http://schemas.openxmlformats.org/presentationml/2006/main">
+  <p:cSld>
+    <p:spTree>
+      <p:nvGrpSpPr>
         <p:cNvPr id="1" name="Shape 479"/>
         <p:cNvGrpSpPr/>
         <p:nvPr/>
@@ -15965,7 +16066,7 @@
 </p:sld>
 </file>
 
-<file path=ppt/slides/slide41.xml><?xml version="1.0" encoding="utf-8"?>
+<file path=ppt/slides/slide42.xml><?xml version="1.0" encoding="utf-8"?>
 <p:sld xmlns:a="http://schemas.openxmlformats.org/drawingml/2006/main" xmlns:r="http://schemas.openxmlformats.org/officeDocument/2006/relationships" xmlns:p="http://schemas.openxmlformats.org/presentationml/2006/main">
   <p:cSld>
     <p:spTree>
@@ -16266,7 +16367,7 @@
 </p:sld>
 </file>
 
-<file path=ppt/slides/slide42.xml><?xml version="1.0" encoding="utf-8"?>
+<file path=ppt/slides/slide43.xml><?xml version="1.0" encoding="utf-8"?>
 <p:sld xmlns:a="http://schemas.openxmlformats.org/drawingml/2006/main" xmlns:r="http://schemas.openxmlformats.org/officeDocument/2006/relationships" xmlns:p="http://schemas.openxmlformats.org/presentationml/2006/main">
   <p:cSld>
     <p:spTree>
@@ -16385,7 +16486,7 @@
 </p:sld>
 </file>
 
-<file path=ppt/slides/slide43.xml><?xml version="1.0" encoding="utf-8"?>
+<file path=ppt/slides/slide44.xml><?xml version="1.0" encoding="utf-8"?>
 <p:sld xmlns:a="http://schemas.openxmlformats.org/drawingml/2006/main" xmlns:r="http://schemas.openxmlformats.org/officeDocument/2006/relationships" xmlns:p="http://schemas.openxmlformats.org/presentationml/2006/main">
   <p:cSld>
     <p:spTree>
@@ -17177,7 +17278,9 @@
             <a:avLst/>
           </a:prstGeom>
           <a:solidFill>
-            <a:srgbClr val="FFD966"/>
+            <a:schemeClr val="bg1">
+              <a:lumMod val="95000"/>
+            </a:schemeClr>
           </a:solidFill>
           <a:ln>
             <a:noFill/>
@@ -17205,18 +17308,41 @@
           <a:p>
             <a:pPr algn="ctr"/>
             <a:r>
-              <a:rPr lang="ru-RU" sz="1600" dirty="0">
+              <a:rPr lang="ru-RU" sz="1400" spc="-20" dirty="0">
                 <a:solidFill>
-                  <a:schemeClr val="tx1"/>
+                  <a:schemeClr val="tx1">
+                    <a:lumMod val="50000"/>
+                    <a:lumOff val="50000"/>
+                  </a:schemeClr>
                 </a:solidFill>
+                <a:latin typeface="Roboto"/>
+                <a:cs typeface="Roboto"/>
               </a:rPr>
-              <a:t>Введение в </a:t>
-            </a:r>
-            <a:r>
-              <a:rPr lang="en-US" sz="1600" dirty="0">
+              <a:t>Введение </a:t>
+            </a:r>
+            <a:r>
+              <a:rPr lang="ru-RU" sz="1400" spc="-20">
                 <a:solidFill>
-                  <a:schemeClr val="tx1"/>
+                  <a:schemeClr val="tx1">
+                    <a:lumMod val="50000"/>
+                    <a:lumOff val="50000"/>
+                  </a:schemeClr>
                 </a:solidFill>
+                <a:latin typeface="Roboto"/>
+                <a:cs typeface="Roboto"/>
+              </a:rPr>
+              <a:t>в </a:t>
+            </a:r>
+            <a:r>
+              <a:rPr lang="en-US" sz="1400" spc="-20" dirty="0">
+                <a:solidFill>
+                  <a:schemeClr val="tx1">
+                    <a:lumMod val="50000"/>
+                    <a:lumOff val="50000"/>
+                  </a:schemeClr>
+                </a:solidFill>
+                <a:latin typeface="Roboto"/>
+                <a:cs typeface="Roboto"/>
               </a:rPr>
               <a:t>Python</a:t>
             </a:r>
@@ -17244,19 +17370,13 @@
             <a:avLst/>
           </a:prstGeom>
           <a:solidFill>
-            <a:srgbClr val="FFD966"/>
+            <a:schemeClr val="bg1">
+              <a:lumMod val="95000"/>
+            </a:schemeClr>
           </a:solidFill>
           <a:ln>
             <a:noFill/>
           </a:ln>
-          <a:effectLst>
-            <a:glow rad="101600">
-              <a:schemeClr val="accent1">
-                <a:satMod val="175000"/>
-                <a:alpha val="40000"/>
-              </a:schemeClr>
-            </a:glow>
-          </a:effectLst>
         </p:spPr>
         <p:style>
           <a:lnRef idx="2">
@@ -17280,18 +17400,37 @@
           <a:p>
             <a:pPr algn="ctr"/>
             <a:r>
-              <a:rPr lang="ru-RU" sz="1400" spc="-10" dirty="0">
+              <a:rPr lang="ru-RU" sz="1400" spc="-20" dirty="0">
                 <a:solidFill>
-                  <a:schemeClr val="tx1"/>
+                  <a:schemeClr val="tx1">
+                    <a:lumMod val="50000"/>
+                    <a:lumOff val="50000"/>
+                  </a:schemeClr>
                 </a:solidFill>
                 <a:latin typeface="Roboto"/>
                 <a:cs typeface="Roboto"/>
               </a:rPr>
-              <a:t>Библиотеки по работе с данными и визуализациями</a:t>
-            </a:r>
-            <a:endParaRPr lang="en-US" sz="1400" spc="-10" dirty="0">
+              <a:t>Библиотеки по работе с данными </a:t>
+            </a:r>
+            <a:r>
+              <a:rPr lang="ru-RU" sz="1400" spc="-20">
+                <a:solidFill>
+                  <a:schemeClr val="tx1">
+                    <a:lumMod val="50000"/>
+                    <a:lumOff val="50000"/>
+                  </a:schemeClr>
+                </a:solidFill>
+                <a:latin typeface="Roboto"/>
+                <a:cs typeface="Roboto"/>
+              </a:rPr>
+              <a:t>и визуализациями</a:t>
+            </a:r>
+            <a:endParaRPr lang="en-US" sz="1400" spc="-20" dirty="0">
               <a:solidFill>
-                <a:schemeClr val="tx1"/>
+                <a:schemeClr val="tx1">
+                  <a:lumMod val="50000"/>
+                  <a:lumOff val="50000"/>
+                </a:schemeClr>
               </a:solidFill>
               <a:latin typeface="Roboto"/>
               <a:cs typeface="Roboto"/>
@@ -17320,7 +17459,9 @@
             <a:avLst/>
           </a:prstGeom>
           <a:solidFill>
-            <a:srgbClr val="FFD966"/>
+            <a:schemeClr val="bg1">
+              <a:lumMod val="95000"/>
+            </a:schemeClr>
           </a:solidFill>
           <a:ln>
             <a:noFill/>
@@ -17350,17 +17491,35 @@
             <a:r>
               <a:rPr lang="ru-RU" sz="1400" spc="-20" dirty="0">
                 <a:solidFill>
-                  <a:schemeClr val="tx1"/>
+                  <a:schemeClr val="tx1">
+                    <a:lumMod val="50000"/>
+                    <a:lumOff val="50000"/>
+                  </a:schemeClr>
                 </a:solidFill>
                 <a:latin typeface="Roboto"/>
                 <a:cs typeface="Roboto"/>
               </a:rPr>
               <a:t>Работа с базами данных, </a:t>
             </a:r>
+            <a:br>
+              <a:rPr lang="ru-RU" sz="1400" spc="-20" dirty="0">
+                <a:solidFill>
+                  <a:schemeClr val="tx1">
+                    <a:lumMod val="50000"/>
+                    <a:lumOff val="50000"/>
+                  </a:schemeClr>
+                </a:solidFill>
+                <a:latin typeface="Roboto"/>
+                <a:cs typeface="Roboto"/>
+              </a:rPr>
+            </a:br>
             <a:r>
               <a:rPr lang="ru-RU" sz="1400" spc="-20" dirty="0" err="1">
                 <a:solidFill>
-                  <a:schemeClr val="tx1"/>
+                  <a:schemeClr val="tx1">
+                    <a:lumMod val="50000"/>
+                    <a:lumOff val="50000"/>
+                  </a:schemeClr>
                 </a:solidFill>
                 <a:latin typeface="Roboto"/>
                 <a:cs typeface="Roboto"/>
@@ -17370,7 +17529,10 @@
             <a:r>
               <a:rPr lang="ru-RU" sz="1400" spc="-20" dirty="0">
                 <a:solidFill>
-                  <a:schemeClr val="tx1"/>
+                  <a:schemeClr val="tx1">
+                    <a:lumMod val="50000"/>
+                    <a:lumOff val="50000"/>
+                  </a:schemeClr>
                 </a:solidFill>
                 <a:latin typeface="Roboto"/>
                 <a:cs typeface="Roboto"/>
@@ -17380,7 +17542,10 @@
             <a:r>
               <a:rPr lang="en-US" sz="1400" spc="-20" dirty="0">
                 <a:solidFill>
-                  <a:schemeClr val="tx1"/>
+                  <a:schemeClr val="tx1">
+                    <a:lumMod val="50000"/>
+                    <a:lumOff val="50000"/>
+                  </a:schemeClr>
                 </a:solidFill>
                 <a:latin typeface="Roboto"/>
                 <a:cs typeface="Roboto"/>
@@ -17546,8 +17711,12 @@
           </a:prstGeom>
           <a:ln w="12700">
             <a:solidFill>
-              <a:schemeClr val="tx1"/>
+              <a:schemeClr val="tx1">
+                <a:lumMod val="50000"/>
+                <a:lumOff val="50000"/>
+              </a:schemeClr>
             </a:solidFill>
+            <a:prstDash val="dash"/>
           </a:ln>
         </p:spPr>
         <p:style>
@@ -17593,8 +17762,12 @@
           </a:prstGeom>
           <a:ln w="12700">
             <a:solidFill>
-              <a:schemeClr val="tx1"/>
+              <a:schemeClr val="tx1">
+                <a:lumMod val="50000"/>
+                <a:lumOff val="50000"/>
+              </a:schemeClr>
             </a:solidFill>
+            <a:prstDash val="dash"/>
           </a:ln>
         </p:spPr>
         <p:style>
@@ -17640,8 +17813,12 @@
           </a:prstGeom>
           <a:ln w="12700">
             <a:solidFill>
-              <a:schemeClr val="tx1"/>
+              <a:schemeClr val="tx1">
+                <a:lumMod val="50000"/>
+                <a:lumOff val="50000"/>
+              </a:schemeClr>
             </a:solidFill>
+            <a:prstDash val="dash"/>
           </a:ln>
         </p:spPr>
         <p:style>
@@ -17732,6 +17909,14 @@
           <a:ln>
             <a:noFill/>
           </a:ln>
+          <a:effectLst>
+            <a:glow rad="101600">
+              <a:schemeClr val="accent1">
+                <a:satMod val="175000"/>
+                <a:alpha val="40000"/>
+              </a:schemeClr>
+            </a:glow>
+          </a:effectLst>
         </p:spPr>
         <p:style>
           <a:lnRef idx="2">
@@ -17755,12 +17940,12 @@
           <a:p>
             <a:pPr algn="ctr"/>
             <a:r>
-              <a:rPr lang="ru-RU" sz="1400" b="0" i="0" u="none" strike="noStrike" dirty="0">
+              <a:rPr lang="ru-RU" sz="1400" spc="-10" dirty="0">
                 <a:solidFill>
                   <a:schemeClr val="tx1"/>
                 </a:solidFill>
-                <a:effectLst/>
-                <a:latin typeface="roboto" panose="02000000000000000000" pitchFamily="2" charset="0"/>
+                <a:latin typeface="Roboto"/>
+                <a:cs typeface="Roboto"/>
               </a:rPr>
               <a:t>Основы статистики</a:t>
             </a:r>

</xml_diff>